<commit_message>
Possibile bozza contenuto corso Informatica Campodarsego
</commit_message>
<xml_diff>
--- a/UniPD/P2 - Semestre 1/08-11/Tutorato 2.pptx
+++ b/UniPD/P2 - Semestre 1/08-11/Tutorato 2.pptx
@@ -5,7 +5,7 @@
     <p:sldMasterId id="2147483660" r:id="rId1"/>
   </p:sldMasterIdLst>
   <p:notesMasterIdLst>
-    <p:notesMasterId r:id="rId36"/>
+    <p:notesMasterId r:id="rId35"/>
   </p:notesMasterIdLst>
   <p:sldIdLst>
     <p:sldId id="256" r:id="rId2"/>
@@ -17,31 +17,30 @@
     <p:sldId id="302" r:id="rId8"/>
     <p:sldId id="303" r:id="rId9"/>
     <p:sldId id="304" r:id="rId10"/>
-    <p:sldId id="305" r:id="rId11"/>
-    <p:sldId id="306" r:id="rId12"/>
-    <p:sldId id="307" r:id="rId13"/>
-    <p:sldId id="308" r:id="rId14"/>
-    <p:sldId id="309" r:id="rId15"/>
-    <p:sldId id="310" r:id="rId16"/>
-    <p:sldId id="311" r:id="rId17"/>
-    <p:sldId id="312" r:id="rId18"/>
-    <p:sldId id="313" r:id="rId19"/>
-    <p:sldId id="283" r:id="rId20"/>
-    <p:sldId id="297" r:id="rId21"/>
-    <p:sldId id="314" r:id="rId22"/>
-    <p:sldId id="315" r:id="rId23"/>
-    <p:sldId id="316" r:id="rId24"/>
-    <p:sldId id="320" r:id="rId25"/>
-    <p:sldId id="318" r:id="rId26"/>
-    <p:sldId id="317" r:id="rId27"/>
-    <p:sldId id="321" r:id="rId28"/>
-    <p:sldId id="323" r:id="rId29"/>
-    <p:sldId id="322" r:id="rId30"/>
-    <p:sldId id="324" r:id="rId31"/>
-    <p:sldId id="325" r:id="rId32"/>
-    <p:sldId id="326" r:id="rId33"/>
-    <p:sldId id="327" r:id="rId34"/>
-    <p:sldId id="328" r:id="rId35"/>
+    <p:sldId id="306" r:id="rId11"/>
+    <p:sldId id="307" r:id="rId12"/>
+    <p:sldId id="308" r:id="rId13"/>
+    <p:sldId id="309" r:id="rId14"/>
+    <p:sldId id="310" r:id="rId15"/>
+    <p:sldId id="311" r:id="rId16"/>
+    <p:sldId id="312" r:id="rId17"/>
+    <p:sldId id="313" r:id="rId18"/>
+    <p:sldId id="283" r:id="rId19"/>
+    <p:sldId id="297" r:id="rId20"/>
+    <p:sldId id="314" r:id="rId21"/>
+    <p:sldId id="315" r:id="rId22"/>
+    <p:sldId id="316" r:id="rId23"/>
+    <p:sldId id="320" r:id="rId24"/>
+    <p:sldId id="318" r:id="rId25"/>
+    <p:sldId id="317" r:id="rId26"/>
+    <p:sldId id="321" r:id="rId27"/>
+    <p:sldId id="323" r:id="rId28"/>
+    <p:sldId id="322" r:id="rId29"/>
+    <p:sldId id="324" r:id="rId30"/>
+    <p:sldId id="325" r:id="rId31"/>
+    <p:sldId id="326" r:id="rId32"/>
+    <p:sldId id="327" r:id="rId33"/>
+    <p:sldId id="328" r:id="rId34"/>
   </p:sldIdLst>
   <p:sldSz cx="9144000" cy="6858000" type="screen4x3"/>
   <p:notesSz cx="6858000" cy="9144000"/>
@@ -1995,10 +1994,10 @@
       </p:sp>
       <p:sp>
         <p:nvSpPr>
-          <p:cNvPr id="3" name="CasellaDiTesto 2">
-            <a:extLst>
-              <a:ext uri="{FF2B5EF4-FFF2-40B4-BE49-F238E27FC236}">
-                <a16:creationId xmlns:a16="http://schemas.microsoft.com/office/drawing/2014/main" id="{A0105AF8-D37D-BDBE-B670-1C2B23318164}"/>
+          <p:cNvPr id="5" name="CasellaDiTesto 4">
+            <a:extLst>
+              <a:ext uri="{FF2B5EF4-FFF2-40B4-BE49-F238E27FC236}">
+                <a16:creationId xmlns:a16="http://schemas.microsoft.com/office/drawing/2014/main" id="{E9308679-6CA3-35D3-9203-BB0E1D85EBDA}"/>
               </a:ext>
             </a:extLst>
           </p:cNvPr>
@@ -2007,8 +2006,8 @@
         </p:nvSpPr>
         <p:spPr>
           <a:xfrm>
-            <a:off x="590926" y="4805134"/>
-            <a:ext cx="8393500" cy="1477328"/>
+            <a:off x="470156" y="1647866"/>
+            <a:ext cx="8393500" cy="3416320"/>
           </a:xfrm>
           <a:prstGeom prst="rect">
             <a:avLst/>
@@ -2027,7 +2026,18 @@
             </a:pPr>
             <a:r>
               <a:rPr lang="it-IT" dirty="0"/>
-              <a:t>L’assegnazione fa in modo entrambi puntino alla stessa area di memoria (posizione iniziale)</a:t>
+              <a:t>Assegnazione </a:t>
+            </a:r>
+            <a:r>
+              <a:rPr lang="it-IT" dirty="0">
+                <a:latin typeface="Courier New" panose="02070309020205020404" pitchFamily="49" charset="0"/>
+                <a:cs typeface="Courier New" panose="02070309020205020404" pitchFamily="49" charset="0"/>
+              </a:rPr>
+              <a:t>b2 = b1 </a:t>
+            </a:r>
+            <a:r>
+              <a:rPr lang="it-IT" dirty="0"/>
+              <a:t>– stessa area di memoria</a:t>
             </a:r>
           </a:p>
           <a:p>
@@ -2043,46 +2053,91 @@
               <a:buChar char="•"/>
             </a:pPr>
             <a:r>
-              <a:rPr lang="it-IT" dirty="0"/>
-              <a:t>La cancellazione deve essere usata con attenzione, perché potremmo puntare a zone non definite in memoria</a:t>
-            </a:r>
-          </a:p>
-        </p:txBody>
-      </p:sp>
-      <p:pic>
-        <p:nvPicPr>
-          <p:cNvPr id="6" name="Immagine 5">
-            <a:extLst>
-              <a:ext uri="{FF2B5EF4-FFF2-40B4-BE49-F238E27FC236}">
-                <a16:creationId xmlns:a16="http://schemas.microsoft.com/office/drawing/2014/main" id="{42BA1A36-5B72-16B0-1265-5CC24E5CC7AC}"/>
-              </a:ext>
-            </a:extLst>
-          </p:cNvPr>
-          <p:cNvPicPr>
-            <a:picLocks noChangeAspect="1"/>
-          </p:cNvPicPr>
-          <p:nvPr/>
-        </p:nvPicPr>
-        <p:blipFill>
-          <a:blip r:embed="rId2"/>
-          <a:stretch>
-            <a:fillRect/>
-          </a:stretch>
-        </p:blipFill>
-        <p:spPr>
-          <a:xfrm>
-            <a:off x="1990137" y="1570241"/>
-            <a:ext cx="4787062" cy="3079397"/>
-          </a:xfrm>
-          <a:prstGeom prst="rect">
-            <a:avLst/>
-          </a:prstGeom>
-        </p:spPr>
-      </p:pic>
+              <a:rPr lang="it-IT" dirty="0">
+                <a:latin typeface="Courier New" panose="02070309020205020404" pitchFamily="49" charset="0"/>
+                <a:cs typeface="Courier New" panose="02070309020205020404" pitchFamily="49" charset="0"/>
+              </a:rPr>
+              <a:t>b2.Togli_Telefonata(t1) </a:t>
+            </a:r>
+            <a:r>
+              <a:rPr lang="it-IT" dirty="0"/>
+              <a:t>– stesso puntatore first</a:t>
+            </a:r>
+          </a:p>
+          <a:p>
+            <a:pPr marL="285750" indent="-285750">
+              <a:buFont typeface="Arial" panose="020B0604020202020204" pitchFamily="34" charset="0"/>
+              <a:buChar char="•"/>
+            </a:pPr>
+            <a:endParaRPr lang="it-IT" dirty="0"/>
+          </a:p>
+          <a:p>
+            <a:pPr marL="285750" indent="-285750">
+              <a:buFont typeface="Arial" panose="020B0604020202020204" pitchFamily="34" charset="0"/>
+              <a:buChar char="•"/>
+            </a:pPr>
+            <a:r>
+              <a:rPr lang="it-IT" dirty="0"/>
+              <a:t>Se rimuovessi l’altra telefonata (in questo momento nulla </a:t>
+            </a:r>
+            <a:r>
+              <a:rPr lang="it-IT" u="sng" dirty="0"/>
+              <a:t>perché copio il valore e non i campi dentro</a:t>
+            </a:r>
+            <a:r>
+              <a:rPr lang="it-IT" dirty="0"/>
+              <a:t>), potremmo avere situazioni </a:t>
+            </a:r>
+            <a:r>
+              <a:rPr lang="it-IT" i="1" dirty="0"/>
+              <a:t>di memoria indefinita</a:t>
+            </a:r>
+          </a:p>
+          <a:p>
+            <a:pPr marL="285750" indent="-285750">
+              <a:buFont typeface="Arial" panose="020B0604020202020204" pitchFamily="34" charset="0"/>
+              <a:buChar char="•"/>
+            </a:pPr>
+            <a:endParaRPr lang="it-IT" i="1" dirty="0"/>
+          </a:p>
+          <a:p>
+            <a:pPr marL="285750" indent="-285750">
+              <a:buFont typeface="Arial" panose="020B0604020202020204" pitchFamily="34" charset="0"/>
+              <a:buChar char="•"/>
+            </a:pPr>
+            <a:r>
+              <a:rPr lang="it-IT" dirty="0"/>
+              <a:t>Di fatto, copio i campi puntatore, ma non gli oggetti a cui puntano (perché non creo nuove istanze dell’oggetto)</a:t>
+            </a:r>
+          </a:p>
+          <a:p>
+            <a:pPr marL="285750" indent="-285750">
+              <a:buFont typeface="Arial" panose="020B0604020202020204" pitchFamily="34" charset="0"/>
+              <a:buChar char="•"/>
+            </a:pPr>
+            <a:endParaRPr lang="it-IT" dirty="0"/>
+          </a:p>
+          <a:p>
+            <a:pPr marL="285750" indent="-285750">
+              <a:buFont typeface="Arial" panose="020B0604020202020204" pitchFamily="34" charset="0"/>
+              <a:buChar char="•"/>
+            </a:pPr>
+            <a:r>
+              <a:rPr lang="it-IT" b="1" dirty="0"/>
+              <a:t>Aliasing</a:t>
+            </a:r>
+            <a:r>
+              <a:rPr lang="it-IT" dirty="0"/>
+              <a:t>: riferimenti di variabili che puntano alla stessa zona di memoria = quanto modificato un dato, l’altro involontariamente viene modificato</a:t>
+            </a:r>
+            <a:endParaRPr lang="it-IT" b="1" dirty="0"/>
+          </a:p>
+        </p:txBody>
+      </p:sp>
     </p:spTree>
     <p:extLst>
       <p:ext uri="{BB962C8B-B14F-4D97-AF65-F5344CB8AC3E}">
-        <p14:creationId xmlns:p14="http://schemas.microsoft.com/office/powerpoint/2010/main" val="1090503285"/>
+        <p14:creationId xmlns:p14="http://schemas.microsoft.com/office/powerpoint/2010/main" val="3662302667"/>
       </p:ext>
     </p:extLst>
   </p:cSld>
@@ -2134,7 +2189,7 @@
           <a:p>
             <a:r>
               <a:rPr lang="it-IT" dirty="0"/>
-              <a:t>Interferenza (o aliasing)</a:t>
+              <a:t>Shallow copy vs deep copy</a:t>
             </a:r>
           </a:p>
         </p:txBody>
@@ -2186,8 +2241,8 @@
         </p:nvSpPr>
         <p:spPr>
           <a:xfrm>
-            <a:off x="470156" y="1647866"/>
-            <a:ext cx="8393500" cy="3416320"/>
+            <a:off x="554255" y="1785889"/>
+            <a:ext cx="8173512" cy="3139321"/>
           </a:xfrm>
           <a:prstGeom prst="rect">
             <a:avLst/>
@@ -2205,119 +2260,73 @@
               <a:buChar char="•"/>
             </a:pPr>
             <a:r>
-              <a:rPr lang="it-IT" dirty="0"/>
-              <a:t>Assegnazione </a:t>
-            </a:r>
-            <a:r>
-              <a:rPr lang="it-IT" dirty="0">
-                <a:latin typeface="Courier New" panose="02070309020205020404" pitchFamily="49" charset="0"/>
-                <a:cs typeface="Courier New" panose="02070309020205020404" pitchFamily="49" charset="0"/>
-              </a:rPr>
-              <a:t>b2 = b1 </a:t>
-            </a:r>
-            <a:r>
-              <a:rPr lang="it-IT" dirty="0"/>
-              <a:t>– stessa area di memoria</a:t>
-            </a:r>
+              <a:rPr lang="it-IT" b="1" dirty="0"/>
+              <a:t>Shallow (superficiale)</a:t>
+            </a:r>
+          </a:p>
+          <a:p>
+            <a:pPr marL="742950" lvl="1" indent="-285750">
+              <a:buFont typeface="Arial" panose="020B0604020202020204" pitchFamily="34" charset="0"/>
+              <a:buChar char="•"/>
+            </a:pPr>
+            <a:r>
+              <a:rPr lang="it-IT" dirty="0"/>
+              <a:t>Crea un nuovo oggetto, ma non crea copie degli oggetti contenuti nell'oggetto originale. Al contrario, copia i riferimenti a tali oggetti </a:t>
+            </a:r>
+          </a:p>
+          <a:p>
+            <a:pPr marL="742950" lvl="1" indent="-285750">
+              <a:buFont typeface="Arial" panose="020B0604020202020204" pitchFamily="34" charset="0"/>
+              <a:buChar char="•"/>
+            </a:pPr>
+            <a:endParaRPr lang="it-IT" b="1" dirty="0"/>
           </a:p>
           <a:p>
             <a:pPr marL="285750" indent="-285750">
               <a:buFont typeface="Arial" panose="020B0604020202020204" pitchFamily="34" charset="0"/>
               <a:buChar char="•"/>
             </a:pPr>
-            <a:endParaRPr lang="it-IT" dirty="0"/>
-          </a:p>
-          <a:p>
-            <a:pPr marL="285750" indent="-285750">
+            <a:r>
+              <a:rPr lang="it-IT" b="1" dirty="0"/>
+              <a:t>Deep (Profonda)</a:t>
+            </a:r>
+          </a:p>
+          <a:p>
+            <a:pPr marL="742950" lvl="1" indent="-285750">
               <a:buFont typeface="Arial" panose="020B0604020202020204" pitchFamily="34" charset="0"/>
               <a:buChar char="•"/>
             </a:pPr>
             <a:r>
-              <a:rPr lang="it-IT" dirty="0">
-                <a:latin typeface="Courier New" panose="02070309020205020404" pitchFamily="49" charset="0"/>
-                <a:cs typeface="Courier New" panose="02070309020205020404" pitchFamily="49" charset="0"/>
-              </a:rPr>
-              <a:t>b2.Togli_Telefonata(t1) </a:t>
-            </a:r>
-            <a:r>
-              <a:rPr lang="it-IT" dirty="0"/>
-              <a:t>– stesso puntatore first</a:t>
-            </a:r>
-          </a:p>
-          <a:p>
-            <a:pPr marL="285750" indent="-285750">
+              <a:rPr lang="it-IT" dirty="0"/>
+              <a:t>Crea un oggetto completamente nuovo con copie di tutti gli oggetti contenuti nell'oggetto originale. </a:t>
+            </a:r>
+          </a:p>
+          <a:p>
+            <a:pPr marL="742950" lvl="1" indent="-285750">
               <a:buFont typeface="Arial" panose="020B0604020202020204" pitchFamily="34" charset="0"/>
               <a:buChar char="•"/>
             </a:pPr>
-            <a:endParaRPr lang="it-IT" dirty="0"/>
-          </a:p>
-          <a:p>
-            <a:pPr marL="285750" indent="-285750">
+            <a:r>
+              <a:rPr lang="it-IT" dirty="0"/>
+              <a:t>Questo include la copia non solo della struttura di primo livello, ma anche di tutti gli oggetti annidati.</a:t>
+            </a:r>
+          </a:p>
+          <a:p>
+            <a:pPr marL="742950" lvl="1" indent="-285750">
               <a:buFont typeface="Arial" panose="020B0604020202020204" pitchFamily="34" charset="0"/>
               <a:buChar char="•"/>
             </a:pPr>
             <a:r>
               <a:rPr lang="it-IT" dirty="0"/>
-              <a:t>Se rimuovessi l’altra telefonata (in questo momento nulla </a:t>
-            </a:r>
-            <a:r>
-              <a:rPr lang="it-IT" u="sng" dirty="0"/>
-              <a:t>perché copio il valore e non i campi dentro</a:t>
-            </a:r>
-            <a:r>
-              <a:rPr lang="it-IT" dirty="0"/>
-              <a:t>), potremmo avere situazioni </a:t>
-            </a:r>
-            <a:r>
-              <a:rPr lang="it-IT" i="1" dirty="0"/>
-              <a:t>di memoria indefinita</a:t>
-            </a:r>
-          </a:p>
-          <a:p>
-            <a:pPr marL="285750" indent="-285750">
-              <a:buFont typeface="Arial" panose="020B0604020202020204" pitchFamily="34" charset="0"/>
-              <a:buChar char="•"/>
-            </a:pPr>
-            <a:endParaRPr lang="it-IT" i="1" dirty="0"/>
-          </a:p>
-          <a:p>
-            <a:pPr marL="285750" indent="-285750">
-              <a:buFont typeface="Arial" panose="020B0604020202020204" pitchFamily="34" charset="0"/>
-              <a:buChar char="•"/>
-            </a:pPr>
-            <a:r>
-              <a:rPr lang="it-IT" dirty="0"/>
-              <a:t>Di fatto, copio i campi puntatore, ma non gli oggetti a cui puntano (perché non creo nuove istanze dell’oggetto)</a:t>
-            </a:r>
-          </a:p>
-          <a:p>
-            <a:pPr marL="285750" indent="-285750">
-              <a:buFont typeface="Arial" panose="020B0604020202020204" pitchFamily="34" charset="0"/>
-              <a:buChar char="•"/>
-            </a:pPr>
-            <a:endParaRPr lang="it-IT" dirty="0"/>
-          </a:p>
-          <a:p>
-            <a:pPr marL="285750" indent="-285750">
-              <a:buFont typeface="Arial" panose="020B0604020202020204" pitchFamily="34" charset="0"/>
-              <a:buChar char="•"/>
-            </a:pPr>
-            <a:r>
-              <a:rPr lang="it-IT" b="1" dirty="0"/>
-              <a:t>Aliasing</a:t>
-            </a:r>
-            <a:r>
-              <a:rPr lang="it-IT" dirty="0"/>
-              <a:t>: riferimenti di variabili che puntano alla stessa zona di memoria = quanto modificato un dato, l’altro involontariamente viene modificato</a:t>
-            </a:r>
-            <a:endParaRPr lang="it-IT" b="1" dirty="0"/>
+              <a:t>Le copie profonde assicurano che il nuovo oggetto sia completamente indipendente dall'oggetto originale.</a:t>
+            </a:r>
           </a:p>
         </p:txBody>
       </p:sp>
     </p:spTree>
     <p:extLst>
       <p:ext uri="{BB962C8B-B14F-4D97-AF65-F5344CB8AC3E}">
-        <p14:creationId xmlns:p14="http://schemas.microsoft.com/office/powerpoint/2010/main" val="3662302667"/>
+        <p14:creationId xmlns:p14="http://schemas.microsoft.com/office/powerpoint/2010/main" val="1189803558"/>
       </p:ext>
     </p:extLst>
   </p:cSld>
@@ -2399,195 +2408,6 @@
               <a:rPr lang="en-US" smtClean="0"/>
               <a:pPr/>
               <a:t>12</a:t>
-            </a:fld>
-            <a:r>
-              <a:rPr lang="en-US" dirty="0"/>
-              <a:t> di 35</a:t>
-            </a:r>
-          </a:p>
-        </p:txBody>
-      </p:sp>
-      <p:sp>
-        <p:nvSpPr>
-          <p:cNvPr id="5" name="CasellaDiTesto 4">
-            <a:extLst>
-              <a:ext uri="{FF2B5EF4-FFF2-40B4-BE49-F238E27FC236}">
-                <a16:creationId xmlns:a16="http://schemas.microsoft.com/office/drawing/2014/main" id="{E9308679-6CA3-35D3-9203-BB0E1D85EBDA}"/>
-              </a:ext>
-            </a:extLst>
-          </p:cNvPr>
-          <p:cNvSpPr txBox="1"/>
-          <p:nvPr/>
-        </p:nvSpPr>
-        <p:spPr>
-          <a:xfrm>
-            <a:off x="554255" y="1785889"/>
-            <a:ext cx="8173512" cy="3139321"/>
-          </a:xfrm>
-          <a:prstGeom prst="rect">
-            <a:avLst/>
-          </a:prstGeom>
-          <a:noFill/>
-        </p:spPr>
-        <p:txBody>
-          <a:bodyPr wrap="square" rtlCol="0">
-            <a:spAutoFit/>
-          </a:bodyPr>
-          <a:lstStyle/>
-          <a:p>
-            <a:pPr marL="285750" indent="-285750">
-              <a:buFont typeface="Arial" panose="020B0604020202020204" pitchFamily="34" charset="0"/>
-              <a:buChar char="•"/>
-            </a:pPr>
-            <a:r>
-              <a:rPr lang="it-IT" b="1" dirty="0"/>
-              <a:t>Shallow (superficiale)</a:t>
-            </a:r>
-          </a:p>
-          <a:p>
-            <a:pPr marL="742950" lvl="1" indent="-285750">
-              <a:buFont typeface="Arial" panose="020B0604020202020204" pitchFamily="34" charset="0"/>
-              <a:buChar char="•"/>
-            </a:pPr>
-            <a:r>
-              <a:rPr lang="it-IT" dirty="0"/>
-              <a:t>Crea un nuovo oggetto, ma non crea copie degli oggetti contenuti nell'oggetto originale. Al contrario, copia i riferimenti a tali oggetti </a:t>
-            </a:r>
-          </a:p>
-          <a:p>
-            <a:pPr marL="742950" lvl="1" indent="-285750">
-              <a:buFont typeface="Arial" panose="020B0604020202020204" pitchFamily="34" charset="0"/>
-              <a:buChar char="•"/>
-            </a:pPr>
-            <a:endParaRPr lang="it-IT" b="1" dirty="0"/>
-          </a:p>
-          <a:p>
-            <a:pPr marL="285750" indent="-285750">
-              <a:buFont typeface="Arial" panose="020B0604020202020204" pitchFamily="34" charset="0"/>
-              <a:buChar char="•"/>
-            </a:pPr>
-            <a:r>
-              <a:rPr lang="it-IT" b="1" dirty="0"/>
-              <a:t>Deep (Profonda)</a:t>
-            </a:r>
-          </a:p>
-          <a:p>
-            <a:pPr marL="742950" lvl="1" indent="-285750">
-              <a:buFont typeface="Arial" panose="020B0604020202020204" pitchFamily="34" charset="0"/>
-              <a:buChar char="•"/>
-            </a:pPr>
-            <a:r>
-              <a:rPr lang="it-IT" dirty="0"/>
-              <a:t>Crea un oggetto completamente nuovo con copie di tutti gli oggetti contenuti nell'oggetto originale. </a:t>
-            </a:r>
-          </a:p>
-          <a:p>
-            <a:pPr marL="742950" lvl="1" indent="-285750">
-              <a:buFont typeface="Arial" panose="020B0604020202020204" pitchFamily="34" charset="0"/>
-              <a:buChar char="•"/>
-            </a:pPr>
-            <a:r>
-              <a:rPr lang="it-IT" dirty="0"/>
-              <a:t>Questo include la copia non solo della struttura di primo livello, ma anche di tutti gli oggetti annidati.</a:t>
-            </a:r>
-          </a:p>
-          <a:p>
-            <a:pPr marL="742950" lvl="1" indent="-285750">
-              <a:buFont typeface="Arial" panose="020B0604020202020204" pitchFamily="34" charset="0"/>
-              <a:buChar char="•"/>
-            </a:pPr>
-            <a:r>
-              <a:rPr lang="it-IT" dirty="0"/>
-              <a:t>Le copie profonde assicurano che il nuovo oggetto sia completamente indipendente dall'oggetto originale.</a:t>
-            </a:r>
-          </a:p>
-        </p:txBody>
-      </p:sp>
-    </p:spTree>
-    <p:extLst>
-      <p:ext uri="{BB962C8B-B14F-4D97-AF65-F5344CB8AC3E}">
-        <p14:creationId xmlns:p14="http://schemas.microsoft.com/office/powerpoint/2010/main" val="1189803558"/>
-      </p:ext>
-    </p:extLst>
-  </p:cSld>
-  <p:clrMapOvr>
-    <a:masterClrMapping/>
-  </p:clrMapOvr>
-</p:sld>
-</file>
-
-<file path=ppt/slides/slide13.xml><?xml version="1.0" encoding="utf-8"?>
-<p:sld xmlns:a="http://schemas.openxmlformats.org/drawingml/2006/main" xmlns:r="http://schemas.openxmlformats.org/officeDocument/2006/relationships" xmlns:p="http://schemas.openxmlformats.org/presentationml/2006/main">
-  <p:cSld>
-    <p:spTree>
-      <p:nvGrpSpPr>
-        <p:cNvPr id="1" name=""/>
-        <p:cNvGrpSpPr/>
-        <p:nvPr/>
-      </p:nvGrpSpPr>
-      <p:grpSpPr>
-        <a:xfrm>
-          <a:off x="0" y="0"/>
-          <a:ext cx="0" cy="0"/>
-          <a:chOff x="0" y="0"/>
-          <a:chExt cx="0" cy="0"/>
-        </a:xfrm>
-      </p:grpSpPr>
-      <p:sp>
-        <p:nvSpPr>
-          <p:cNvPr id="2" name="Titolo 1">
-            <a:extLst>
-              <a:ext uri="{FF2B5EF4-FFF2-40B4-BE49-F238E27FC236}">
-                <a16:creationId xmlns:a16="http://schemas.microsoft.com/office/drawing/2014/main" id="{A1C33B46-A1F8-111B-8108-D696C1BBCC68}"/>
-              </a:ext>
-            </a:extLst>
-          </p:cNvPr>
-          <p:cNvSpPr>
-            <a:spLocks noGrp="1"/>
-          </p:cNvSpPr>
-          <p:nvPr>
-            <p:ph type="title"/>
-          </p:nvPr>
-        </p:nvSpPr>
-        <p:spPr/>
-        <p:txBody>
-          <a:bodyPr>
-            <a:normAutofit/>
-          </a:bodyPr>
-          <a:lstStyle/>
-          <a:p>
-            <a:r>
-              <a:rPr lang="it-IT" dirty="0"/>
-              <a:t>Shallow copy vs deep copy</a:t>
-            </a:r>
-          </a:p>
-        </p:txBody>
-      </p:sp>
-      <p:sp>
-        <p:nvSpPr>
-          <p:cNvPr id="4" name="Segnaposto numero diapositiva 3">
-            <a:extLst>
-              <a:ext uri="{FF2B5EF4-FFF2-40B4-BE49-F238E27FC236}">
-                <a16:creationId xmlns:a16="http://schemas.microsoft.com/office/drawing/2014/main" id="{30F37182-85E1-1CBA-A05A-CCEC4E40C29C}"/>
-              </a:ext>
-            </a:extLst>
-          </p:cNvPr>
-          <p:cNvSpPr>
-            <a:spLocks noGrp="1"/>
-          </p:cNvSpPr>
-          <p:nvPr>
-            <p:ph type="sldNum" sz="quarter" idx="4"/>
-          </p:nvPr>
-        </p:nvSpPr>
-        <p:spPr/>
-        <p:txBody>
-          <a:bodyPr/>
-          <a:lstStyle/>
-          <a:p>
-            <a:fld id="{4D021CEB-2F22-4EA1-9BAF-E3833982B82A}" type="slidenum">
-              <a:rPr lang="en-US" smtClean="0"/>
-              <a:pPr/>
-              <a:t>13</a:t>
             </a:fld>
             <a:r>
               <a:rPr lang="en-US" dirty="0"/>
@@ -2656,7 +2476,7 @@
 </p:sld>
 </file>
 
-<file path=ppt/slides/slide14.xml><?xml version="1.0" encoding="utf-8"?>
+<file path=ppt/slides/slide13.xml><?xml version="1.0" encoding="utf-8"?>
 <p:sld xmlns:a="http://schemas.openxmlformats.org/drawingml/2006/main" xmlns:r="http://schemas.openxmlformats.org/officeDocument/2006/relationships" xmlns:p="http://schemas.openxmlformats.org/presentationml/2006/main">
   <p:cSld>
     <p:spTree>
@@ -2727,7 +2547,7 @@
             <a:fld id="{4D021CEB-2F22-4EA1-9BAF-E3833982B82A}" type="slidenum">
               <a:rPr lang="en-US" smtClean="0"/>
               <a:pPr/>
-              <a:t>14</a:t>
+              <a:t>13</a:t>
             </a:fld>
             <a:r>
               <a:rPr lang="en-US" dirty="0"/>
@@ -2880,7 +2700,7 @@
 </p:sld>
 </file>
 
-<file path=ppt/slides/slide15.xml><?xml version="1.0" encoding="utf-8"?>
+<file path=ppt/slides/slide14.xml><?xml version="1.0" encoding="utf-8"?>
 <p:sld xmlns:a="http://schemas.openxmlformats.org/drawingml/2006/main" xmlns:r="http://schemas.openxmlformats.org/officeDocument/2006/relationships" xmlns:p="http://schemas.openxmlformats.org/presentationml/2006/main">
   <p:cSld>
     <p:spTree>
@@ -2951,7 +2771,7 @@
             <a:fld id="{4D021CEB-2F22-4EA1-9BAF-E3833982B82A}" type="slidenum">
               <a:rPr lang="en-US" smtClean="0"/>
               <a:pPr/>
-              <a:t>15</a:t>
+              <a:t>14</a:t>
             </a:fld>
             <a:r>
               <a:rPr lang="en-US" dirty="0"/>
@@ -3142,7 +2962,7 @@
 </p:sld>
 </file>
 
-<file path=ppt/slides/slide16.xml><?xml version="1.0" encoding="utf-8"?>
+<file path=ppt/slides/slide15.xml><?xml version="1.0" encoding="utf-8"?>
 <p:sld xmlns:a="http://schemas.openxmlformats.org/drawingml/2006/main" xmlns:r="http://schemas.openxmlformats.org/officeDocument/2006/relationships" xmlns:p="http://schemas.openxmlformats.org/presentationml/2006/main">
   <p:cSld>
     <p:spTree>
@@ -3213,7 +3033,7 @@
             <a:fld id="{4D021CEB-2F22-4EA1-9BAF-E3833982B82A}" type="slidenum">
               <a:rPr lang="en-US" smtClean="0"/>
               <a:pPr/>
-              <a:t>16</a:t>
+              <a:t>15</a:t>
             </a:fld>
             <a:r>
               <a:rPr lang="en-US" dirty="0"/>
@@ -3340,6 +3160,225 @@
 </p:sld>
 </file>
 
+<file path=ppt/slides/slide16.xml><?xml version="1.0" encoding="utf-8"?>
+<p:sld xmlns:a="http://schemas.openxmlformats.org/drawingml/2006/main" xmlns:r="http://schemas.openxmlformats.org/officeDocument/2006/relationships" xmlns:p="http://schemas.openxmlformats.org/presentationml/2006/main">
+  <p:cSld>
+    <p:spTree>
+      <p:nvGrpSpPr>
+        <p:cNvPr id="1" name=""/>
+        <p:cNvGrpSpPr/>
+        <p:nvPr/>
+      </p:nvGrpSpPr>
+      <p:grpSpPr>
+        <a:xfrm>
+          <a:off x="0" y="0"/>
+          <a:ext cx="0" cy="0"/>
+          <a:chOff x="0" y="0"/>
+          <a:chExt cx="0" cy="0"/>
+        </a:xfrm>
+      </p:grpSpPr>
+      <p:sp>
+        <p:nvSpPr>
+          <p:cNvPr id="2" name="Titolo 1">
+            <a:extLst>
+              <a:ext uri="{FF2B5EF4-FFF2-40B4-BE49-F238E27FC236}">
+                <a16:creationId xmlns:a16="http://schemas.microsoft.com/office/drawing/2014/main" id="{A1C33B46-A1F8-111B-8108-D696C1BBCC68}"/>
+              </a:ext>
+            </a:extLst>
+          </p:cNvPr>
+          <p:cNvSpPr>
+            <a:spLocks noGrp="1"/>
+          </p:cNvSpPr>
+          <p:nvPr>
+            <p:ph type="title"/>
+          </p:nvPr>
+        </p:nvSpPr>
+        <p:spPr/>
+        <p:txBody>
+          <a:bodyPr>
+            <a:normAutofit/>
+          </a:bodyPr>
+          <a:lstStyle/>
+          <a:p>
+            <a:r>
+              <a:rPr lang="it-IT" dirty="0"/>
+              <a:t>Valore vs riferimento</a:t>
+            </a:r>
+          </a:p>
+        </p:txBody>
+      </p:sp>
+      <p:sp>
+        <p:nvSpPr>
+          <p:cNvPr id="4" name="Segnaposto numero diapositiva 3">
+            <a:extLst>
+              <a:ext uri="{FF2B5EF4-FFF2-40B4-BE49-F238E27FC236}">
+                <a16:creationId xmlns:a16="http://schemas.microsoft.com/office/drawing/2014/main" id="{30F37182-85E1-1CBA-A05A-CCEC4E40C29C}"/>
+              </a:ext>
+            </a:extLst>
+          </p:cNvPr>
+          <p:cNvSpPr>
+            <a:spLocks noGrp="1"/>
+          </p:cNvSpPr>
+          <p:nvPr>
+            <p:ph type="sldNum" sz="quarter" idx="4"/>
+          </p:nvPr>
+        </p:nvSpPr>
+        <p:spPr/>
+        <p:txBody>
+          <a:bodyPr/>
+          <a:lstStyle/>
+          <a:p>
+            <a:fld id="{4D021CEB-2F22-4EA1-9BAF-E3833982B82A}" type="slidenum">
+              <a:rPr lang="en-US" smtClean="0"/>
+              <a:pPr/>
+              <a:t>16</a:t>
+            </a:fld>
+            <a:r>
+              <a:rPr lang="en-US" dirty="0"/>
+              <a:t> di 35</a:t>
+            </a:r>
+          </a:p>
+        </p:txBody>
+      </p:sp>
+      <p:sp>
+        <p:nvSpPr>
+          <p:cNvPr id="3" name="CasellaDiTesto 2">
+            <a:extLst>
+              <a:ext uri="{FF2B5EF4-FFF2-40B4-BE49-F238E27FC236}">
+                <a16:creationId xmlns:a16="http://schemas.microsoft.com/office/drawing/2014/main" id="{62AB47FC-463E-8AD5-F618-A123DA567765}"/>
+              </a:ext>
+            </a:extLst>
+          </p:cNvPr>
+          <p:cNvSpPr txBox="1"/>
+          <p:nvPr/>
+        </p:nvSpPr>
+        <p:spPr>
+          <a:xfrm>
+            <a:off x="349385" y="1474501"/>
+            <a:ext cx="8635041" cy="4247317"/>
+          </a:xfrm>
+          <a:prstGeom prst="rect">
+            <a:avLst/>
+          </a:prstGeom>
+          <a:noFill/>
+        </p:spPr>
+        <p:txBody>
+          <a:bodyPr wrap="square" rtlCol="0">
+            <a:spAutoFit/>
+          </a:bodyPr>
+          <a:lstStyle/>
+          <a:p>
+            <a:r>
+              <a:rPr lang="it-IT" b="1" dirty="0"/>
+              <a:t>Valore:</a:t>
+            </a:r>
+          </a:p>
+          <a:p>
+            <a:endParaRPr lang="it-IT" dirty="0"/>
+          </a:p>
+          <a:p>
+            <a:pPr marL="285750" indent="-285750">
+              <a:buFont typeface="Arial" panose="020B0604020202020204" pitchFamily="34" charset="0"/>
+              <a:buChar char="•"/>
+            </a:pPr>
+            <a:r>
+              <a:rPr lang="it-IT" dirty="0"/>
+              <a:t>Viene creato un duplicato (copia) del valore originale (uso memoria) </a:t>
+            </a:r>
+          </a:p>
+          <a:p>
+            <a:pPr marL="285750" indent="-285750">
+              <a:buFont typeface="Arial" panose="020B0604020202020204" pitchFamily="34" charset="0"/>
+              <a:buChar char="•"/>
+            </a:pPr>
+            <a:r>
+              <a:rPr lang="it-IT" dirty="0"/>
+              <a:t>La funzione lavora con una copia dei dati, e qualsiasi modifica effettuata all'interno della funzione non influisce sulla variabile o sull'oggetto originale.</a:t>
+            </a:r>
+          </a:p>
+          <a:p>
+            <a:pPr marL="285750" indent="-285750">
+              <a:buFont typeface="Arial" panose="020B0604020202020204" pitchFamily="34" charset="0"/>
+              <a:buChar char="•"/>
+            </a:pPr>
+            <a:r>
+              <a:rPr lang="it-IT" dirty="0"/>
+              <a:t>Aka = </a:t>
+            </a:r>
+            <a:r>
+              <a:rPr lang="it-IT" u="sng" dirty="0"/>
+              <a:t>Si condivisione </a:t>
+            </a:r>
+            <a:r>
+              <a:rPr lang="it-IT" dirty="0"/>
+              <a:t>di memoria, modifiche solo alla variabile nella funzione, memoria non deallocata</a:t>
+            </a:r>
+          </a:p>
+          <a:p>
+            <a:endParaRPr lang="it-IT" dirty="0"/>
+          </a:p>
+          <a:p>
+            <a:r>
+              <a:rPr lang="it-IT" b="1" dirty="0"/>
+              <a:t>Riferimento:</a:t>
+            </a:r>
+          </a:p>
+          <a:p>
+            <a:endParaRPr lang="it-IT" dirty="0"/>
+          </a:p>
+          <a:p>
+            <a:pPr marL="285750" indent="-285750">
+              <a:buFont typeface="Arial" panose="020B0604020202020204" pitchFamily="34" charset="0"/>
+              <a:buChar char="•"/>
+            </a:pPr>
+            <a:r>
+              <a:rPr lang="it-IT" dirty="0"/>
+              <a:t>Viene passato un riferimento o un puntatore all'oggetto originale (non uso memoria). </a:t>
+            </a:r>
+          </a:p>
+          <a:p>
+            <a:pPr marL="285750" indent="-285750">
+              <a:buFont typeface="Arial" panose="020B0604020202020204" pitchFamily="34" charset="0"/>
+              <a:buChar char="•"/>
+            </a:pPr>
+            <a:r>
+              <a:rPr lang="it-IT" dirty="0"/>
+              <a:t>Questo significa che la funzione lavora direttamente con l'oggetto originale, e le modifiche all'interno della funzione si riflettono nell'oggetto originale.</a:t>
+            </a:r>
+          </a:p>
+          <a:p>
+            <a:pPr marL="285750" indent="-285750">
+              <a:buFont typeface="Arial" panose="020B0604020202020204" pitchFamily="34" charset="0"/>
+              <a:buChar char="•"/>
+            </a:pPr>
+            <a:r>
+              <a:rPr lang="it-IT" dirty="0"/>
+              <a:t>Aka = </a:t>
+            </a:r>
+            <a:r>
+              <a:rPr lang="it-IT" u="sng" dirty="0"/>
+              <a:t>No condivisione </a:t>
+            </a:r>
+            <a:r>
+              <a:rPr lang="it-IT" dirty="0"/>
+              <a:t>di memoria, modifiche a tutti gli oggetti puntati, memoria non condivisa (meno dispendioso)</a:t>
+            </a:r>
+          </a:p>
+        </p:txBody>
+      </p:sp>
+    </p:spTree>
+    <p:extLst>
+      <p:ext uri="{BB962C8B-B14F-4D97-AF65-F5344CB8AC3E}">
+        <p14:creationId xmlns:p14="http://schemas.microsoft.com/office/powerpoint/2010/main" val="166357682"/>
+      </p:ext>
+    </p:extLst>
+  </p:cSld>
+  <p:clrMapOvr>
+    <a:masterClrMapping/>
+  </p:clrMapOvr>
+</p:sld>
+</file>
+
 <file path=ppt/slides/slide17.xml><?xml version="1.0" encoding="utf-8"?>
 <p:sld xmlns:a="http://schemas.openxmlformats.org/drawingml/2006/main" xmlns:r="http://schemas.openxmlformats.org/officeDocument/2006/relationships" xmlns:p="http://schemas.openxmlformats.org/presentationml/2006/main">
   <p:cSld>
@@ -3382,7 +3421,7 @@
           <a:p>
             <a:r>
               <a:rPr lang="it-IT" dirty="0"/>
-              <a:t>Valore vs riferimento</a:t>
+              <a:t>Durata delle variabili - lifetime</a:t>
             </a:r>
           </a:p>
         </p:txBody>
@@ -3434,8 +3473,8 @@
         </p:nvSpPr>
         <p:spPr>
           <a:xfrm>
-            <a:off x="349385" y="1474501"/>
-            <a:ext cx="8635041" cy="4247317"/>
+            <a:off x="254479" y="2164614"/>
+            <a:ext cx="8635041" cy="2308324"/>
           </a:xfrm>
           <a:prstGeom prst="rect">
             <a:avLst/>
@@ -3450,98 +3489,56 @@
           <a:p>
             <a:r>
               <a:rPr lang="it-IT" b="1" dirty="0"/>
-              <a:t>Valore:</a:t>
-            </a:r>
-          </a:p>
-          <a:p>
-            <a:endParaRPr lang="it-IT" dirty="0"/>
-          </a:p>
-          <a:p>
-            <a:pPr marL="285750" indent="-285750">
-              <a:buFont typeface="Arial" panose="020B0604020202020204" pitchFamily="34" charset="0"/>
-              <a:buChar char="•"/>
-            </a:pPr>
-            <a:r>
-              <a:rPr lang="it-IT" dirty="0"/>
-              <a:t>Viene creato un duplicato (copia) del valore originale (uso memoria) </a:t>
-            </a:r>
-          </a:p>
-          <a:p>
-            <a:pPr marL="285750" indent="-285750">
-              <a:buFont typeface="Arial" panose="020B0604020202020204" pitchFamily="34" charset="0"/>
-              <a:buChar char="•"/>
-            </a:pPr>
-            <a:r>
-              <a:rPr lang="it-IT" dirty="0"/>
-              <a:t>La funzione lavora con una copia dei dati, e qualsiasi modifica effettuata all'interno della funzione non influisce sulla variabile o sull'oggetto originale.</a:t>
-            </a:r>
-          </a:p>
-          <a:p>
-            <a:pPr marL="285750" indent="-285750">
-              <a:buFont typeface="Arial" panose="020B0604020202020204" pitchFamily="34" charset="0"/>
-              <a:buChar char="•"/>
-            </a:pPr>
-            <a:r>
-              <a:rPr lang="it-IT" dirty="0"/>
-              <a:t>Aka = </a:t>
+              <a:t>Variabili di classe automatica: </a:t>
+            </a:r>
+            <a:r>
+              <a:rPr lang="it-IT" dirty="0"/>
+              <a:t>definite dentro una funzione, deallocate al termine del blocco del programma </a:t>
+            </a:r>
+          </a:p>
+          <a:p>
+            <a:endParaRPr lang="it-IT" b="1" dirty="0"/>
+          </a:p>
+          <a:p>
+            <a:r>
+              <a:rPr lang="it-IT" b="1" dirty="0"/>
+              <a:t>Variabili di classe statica: </a:t>
+            </a:r>
+            <a:r>
+              <a:rPr lang="it-IT" dirty="0"/>
+              <a:t>allocate all’inizio dell’esecuzione del programma, deallocate al termine</a:t>
+            </a:r>
+          </a:p>
+          <a:p>
+            <a:endParaRPr lang="it-IT" b="1" dirty="0"/>
+          </a:p>
+          <a:p>
+            <a:r>
+              <a:rPr lang="it-IT" b="1" dirty="0"/>
+              <a:t>Variabili dinamiche: </a:t>
+            </a:r>
+            <a:r>
+              <a:rPr lang="it-IT" dirty="0"/>
+              <a:t>sempre allocate nello heap, deallocata esplicitamente con l’operatore </a:t>
+            </a:r>
+            <a:r>
+              <a:rPr lang="it-IT" dirty="0">
+                <a:latin typeface="Courier New" panose="02070309020205020404" pitchFamily="49" charset="0"/>
+                <a:cs typeface="Courier New" panose="02070309020205020404" pitchFamily="49" charset="0"/>
+              </a:rPr>
+              <a:t>delete</a:t>
+            </a:r>
+            <a:r>
+              <a:rPr lang="it-IT" dirty="0"/>
+              <a:t> (</a:t>
             </a:r>
             <a:r>
               <a:rPr lang="it-IT" u="sng" dirty="0"/>
-              <a:t>Si condivisione </a:t>
-            </a:r>
-            <a:r>
-              <a:rPr lang="it-IT" dirty="0"/>
-              <a:t>di memoria, modifiche solo alla variabile nella funzione, memoria non deallocata</a:t>
-            </a:r>
-          </a:p>
-          <a:p>
-            <a:endParaRPr lang="it-IT" dirty="0"/>
-          </a:p>
-          <a:p>
-            <a:r>
-              <a:rPr lang="it-IT" b="1" dirty="0"/>
-              <a:t>Riferimento:</a:t>
-            </a:r>
-          </a:p>
-          <a:p>
-            <a:endParaRPr lang="it-IT" dirty="0"/>
-          </a:p>
-          <a:p>
-            <a:pPr marL="285750" indent="-285750">
-              <a:buFont typeface="Arial" panose="020B0604020202020204" pitchFamily="34" charset="0"/>
-              <a:buChar char="•"/>
-            </a:pPr>
-            <a:r>
-              <a:rPr lang="it-IT" dirty="0"/>
-              <a:t>Viene passato un riferimento o un puntatore all'oggetto originale (non uso memoria). </a:t>
-            </a:r>
-          </a:p>
-          <a:p>
-            <a:pPr marL="285750" indent="-285750">
-              <a:buFont typeface="Arial" panose="020B0604020202020204" pitchFamily="34" charset="0"/>
-              <a:buChar char="•"/>
-            </a:pPr>
-            <a:r>
-              <a:rPr lang="it-IT" dirty="0"/>
-              <a:t>Questo significa che la funzione lavora direttamente con l'oggetto originale, e le modifiche all'interno della funzione si riflettono nell'oggetto originale.</a:t>
-            </a:r>
-          </a:p>
-          <a:p>
-            <a:pPr marL="285750" indent="-285750">
-              <a:buFont typeface="Arial" panose="020B0604020202020204" pitchFamily="34" charset="0"/>
-              <a:buChar char="•"/>
-            </a:pPr>
-            <a:r>
-              <a:rPr lang="it-IT" dirty="0"/>
-              <a:t>Aka = </a:t>
-            </a:r>
-            <a:r>
-              <a:rPr lang="it-IT" u="sng" dirty="0"/>
-              <a:t>No condivisione </a:t>
-            </a:r>
-            <a:r>
-              <a:rPr lang="it-IT" dirty="0"/>
-              <a:t>di memoria, modifiche a tutti gli oggetti puntati, memoria non condivisa (meno dispendioso)</a:t>
+              <a:t>garbage collection</a:t>
+            </a:r>
+            <a:r>
+              <a:rPr lang="it-IT" dirty="0"/>
+              <a:t>)</a:t>
             </a:r>
           </a:p>
         </p:txBody>
@@ -3549,7 +3546,7 @@
     </p:spTree>
     <p:extLst>
       <p:ext uri="{BB962C8B-B14F-4D97-AF65-F5344CB8AC3E}">
-        <p14:creationId xmlns:p14="http://schemas.microsoft.com/office/powerpoint/2010/main" val="166357682"/>
+        <p14:creationId xmlns:p14="http://schemas.microsoft.com/office/powerpoint/2010/main" val="2847862359"/>
       </p:ext>
     </p:extLst>
   </p:cSld>
@@ -3594,14 +3591,12 @@
         </p:nvSpPr>
         <p:spPr/>
         <p:txBody>
-          <a:bodyPr>
-            <a:normAutofit/>
-          </a:bodyPr>
-          <a:lstStyle/>
-          <a:p>
-            <a:r>
-              <a:rPr lang="it-IT" dirty="0"/>
-              <a:t>Durata delle variabili - lifetime</a:t>
+          <a:bodyPr/>
+          <a:lstStyle/>
+          <a:p>
+            <a:r>
+              <a:rPr lang="it-IT" dirty="0"/>
+              <a:t>Costruttori: regole</a:t>
             </a:r>
           </a:p>
         </p:txBody>
@@ -3644,7 +3639,7 @@
           <p:cNvPr id="3" name="CasellaDiTesto 2">
             <a:extLst>
               <a:ext uri="{FF2B5EF4-FFF2-40B4-BE49-F238E27FC236}">
-                <a16:creationId xmlns:a16="http://schemas.microsoft.com/office/drawing/2014/main" id="{62AB47FC-463E-8AD5-F618-A123DA567765}"/>
+                <a16:creationId xmlns:a16="http://schemas.microsoft.com/office/drawing/2014/main" id="{882FCE22-207E-4077-C468-65DB9728DF24}"/>
               </a:ext>
             </a:extLst>
           </p:cNvPr>
@@ -3653,8 +3648,8 @@
         </p:nvSpPr>
         <p:spPr>
           <a:xfrm>
-            <a:off x="254479" y="2164614"/>
-            <a:ext cx="8635041" cy="2308324"/>
+            <a:off x="993360" y="1534885"/>
+            <a:ext cx="7157279" cy="2308324"/>
           </a:xfrm>
           <a:prstGeom prst="rect">
             <a:avLst/>
@@ -3667,66 +3662,102 @@
           </a:bodyPr>
           <a:lstStyle/>
           <a:p>
-            <a:r>
-              <a:rPr lang="it-IT" b="1" dirty="0"/>
-              <a:t>Variabili di classe automatica: </a:t>
-            </a:r>
-            <a:r>
-              <a:rPr lang="it-IT" dirty="0"/>
-              <a:t>definite dentro una funzione, deallocate al termine del blocco del programma </a:t>
-            </a:r>
-          </a:p>
-          <a:p>
-            <a:endParaRPr lang="it-IT" b="1" dirty="0"/>
-          </a:p>
-          <a:p>
-            <a:r>
-              <a:rPr lang="it-IT" b="1" dirty="0"/>
-              <a:t>Variabili di classe statica: </a:t>
-            </a:r>
-            <a:r>
-              <a:rPr lang="it-IT" dirty="0"/>
-              <a:t>allocate all’inizio dell’esecuzione del programma, deallocate al termine</a:t>
-            </a:r>
-          </a:p>
-          <a:p>
-            <a:endParaRPr lang="it-IT" b="1" dirty="0"/>
-          </a:p>
-          <a:p>
-            <a:r>
-              <a:rPr lang="it-IT" b="1" dirty="0"/>
-              <a:t>Variabili dinamiche: </a:t>
-            </a:r>
-            <a:r>
-              <a:rPr lang="it-IT" dirty="0"/>
-              <a:t>sempre allocate nello heap, deallocata esplicitamente con l’operatore </a:t>
-            </a:r>
-            <a:r>
-              <a:rPr lang="it-IT" dirty="0">
-                <a:latin typeface="Courier New" panose="02070309020205020404" pitchFamily="49" charset="0"/>
-                <a:cs typeface="Courier New" panose="02070309020205020404" pitchFamily="49" charset="0"/>
-              </a:rPr>
-              <a:t>delete</a:t>
-            </a:r>
-            <a:r>
-              <a:rPr lang="it-IT" dirty="0"/>
-              <a:t> (</a:t>
-            </a:r>
-            <a:r>
-              <a:rPr lang="it-IT" u="sng" dirty="0"/>
-              <a:t>garbage collection</a:t>
-            </a:r>
-            <a:r>
-              <a:rPr lang="it-IT" dirty="0"/>
-              <a:t>)</a:t>
-            </a:r>
-          </a:p>
-        </p:txBody>
-      </p:sp>
+            <a:pPr marL="342900" indent="-342900">
+              <a:buFont typeface="+mj-lt"/>
+              <a:buAutoNum type="arabicPeriod"/>
+            </a:pPr>
+            <a:r>
+              <a:rPr lang="it-IT" dirty="0"/>
+              <a:t>Usiamo lo stesso ordine di dichiarazione dei campi dati</a:t>
+            </a:r>
+          </a:p>
+          <a:p>
+            <a:pPr marL="342900" indent="-342900">
+              <a:buFont typeface="+mj-lt"/>
+              <a:buAutoNum type="arabicPeriod"/>
+            </a:pPr>
+            <a:endParaRPr lang="it-IT" dirty="0"/>
+          </a:p>
+          <a:p>
+            <a:pPr marL="342900" indent="-342900">
+              <a:buFont typeface="+mj-lt"/>
+              <a:buAutoNum type="arabicPeriod"/>
+            </a:pPr>
+            <a:r>
+              <a:rPr lang="it-IT" dirty="0"/>
+              <a:t>Costruiamo i campi allocando uno spazio in memoria per ogni variabile per i tipi non classe</a:t>
+            </a:r>
+          </a:p>
+          <a:p>
+            <a:pPr marL="342900" indent="-342900">
+              <a:buFont typeface="+mj-lt"/>
+              <a:buAutoNum type="arabicPeriod"/>
+            </a:pPr>
+            <a:endParaRPr lang="it-IT" dirty="0"/>
+          </a:p>
+          <a:p>
+            <a:pPr marL="342900" indent="-342900">
+              <a:buFont typeface="+mj-lt"/>
+              <a:buAutoNum type="arabicPeriod"/>
+            </a:pPr>
+            <a:r>
+              <a:rPr lang="it-IT" dirty="0"/>
+              <a:t>Per ogni campo di tipo classe, chiamiamo costruttore default</a:t>
+            </a:r>
+          </a:p>
+          <a:p>
+            <a:pPr marL="342900" indent="-342900">
+              <a:buFont typeface="+mj-lt"/>
+              <a:buAutoNum type="arabicPeriod"/>
+            </a:pPr>
+            <a:endParaRPr lang="it-IT" dirty="0"/>
+          </a:p>
+          <a:p>
+            <a:pPr marL="342900" indent="-342900">
+              <a:buFont typeface="+mj-lt"/>
+              <a:buAutoNum type="arabicPeriod"/>
+            </a:pPr>
+            <a:r>
+              <a:rPr lang="it-IT" dirty="0"/>
+              <a:t>Eseguiamo il corpo del costruttore</a:t>
+            </a:r>
+          </a:p>
+        </p:txBody>
+      </p:sp>
+      <p:pic>
+        <p:nvPicPr>
+          <p:cNvPr id="6" name="Immagine 5">
+            <a:extLst>
+              <a:ext uri="{FF2B5EF4-FFF2-40B4-BE49-F238E27FC236}">
+                <a16:creationId xmlns:a16="http://schemas.microsoft.com/office/drawing/2014/main" id="{23A7DF75-AE9D-ACF9-FA18-F2856AD1E584}"/>
+              </a:ext>
+            </a:extLst>
+          </p:cNvPr>
+          <p:cNvPicPr>
+            <a:picLocks noChangeAspect="1"/>
+          </p:cNvPicPr>
+          <p:nvPr/>
+        </p:nvPicPr>
+        <p:blipFill>
+          <a:blip r:embed="rId2"/>
+          <a:stretch>
+            <a:fillRect/>
+          </a:stretch>
+        </p:blipFill>
+        <p:spPr>
+          <a:xfrm>
+            <a:off x="1666878" y="4263669"/>
+            <a:ext cx="5810244" cy="825719"/>
+          </a:xfrm>
+          <a:prstGeom prst="rect">
+            <a:avLst/>
+          </a:prstGeom>
+        </p:spPr>
+      </p:pic>
     </p:spTree>
     <p:extLst>
       <p:ext uri="{BB962C8B-B14F-4D97-AF65-F5344CB8AC3E}">
-        <p14:creationId xmlns:p14="http://schemas.microsoft.com/office/powerpoint/2010/main" val="2847862359"/>
+        <p14:creationId xmlns:p14="http://schemas.microsoft.com/office/powerpoint/2010/main" val="2865899089"/>
       </p:ext>
     </p:extLst>
   </p:cSld>
@@ -3776,7 +3807,7 @@
           <a:p>
             <a:r>
               <a:rPr lang="it-IT" dirty="0"/>
-              <a:t>Costruttori: regole</a:t>
+              <a:t>Distruttori</a:t>
             </a:r>
           </a:p>
         </p:txBody>
@@ -3828,8 +3859,8 @@
         </p:nvSpPr>
         <p:spPr>
           <a:xfrm>
-            <a:off x="993360" y="1534885"/>
-            <a:ext cx="7157279" cy="2308324"/>
+            <a:off x="1020563" y="1440497"/>
+            <a:ext cx="6662374" cy="1477328"/>
           </a:xfrm>
           <a:prstGeom prst="rect">
             <a:avLst/>
@@ -3842,74 +3873,43 @@
           </a:bodyPr>
           <a:lstStyle/>
           <a:p>
-            <a:pPr marL="342900" indent="-342900">
-              <a:buFont typeface="+mj-lt"/>
-              <a:buAutoNum type="arabicPeriod"/>
+            <a:pPr marL="285750" indent="-285750">
+              <a:buFont typeface="Arial" panose="020B0604020202020204" pitchFamily="34" charset="0"/>
+              <a:buChar char="•"/>
             </a:pPr>
             <a:r>
               <a:rPr lang="it-IT" dirty="0"/>
-              <a:t>Usiamo lo stesso ordine di dichiarazione dei campi dati</a:t>
-            </a:r>
-          </a:p>
-          <a:p>
-            <a:pPr marL="342900" indent="-342900">
-              <a:buFont typeface="+mj-lt"/>
-              <a:buAutoNum type="arabicPeriod"/>
+              <a:t>Evitano gli sprechi di memoria e rilasciano la memoria occupata</a:t>
+            </a:r>
+          </a:p>
+          <a:p>
+            <a:pPr marL="285750" indent="-285750">
+              <a:buFont typeface="Arial" panose="020B0604020202020204" pitchFamily="34" charset="0"/>
+              <a:buChar char="•"/>
             </a:pPr>
             <a:endParaRPr lang="it-IT" dirty="0"/>
           </a:p>
           <a:p>
-            <a:pPr marL="342900" indent="-342900">
-              <a:buFont typeface="+mj-lt"/>
-              <a:buAutoNum type="arabicPeriod"/>
+            <a:pPr marL="285750" indent="-285750">
+              <a:buFont typeface="Arial" panose="020B0604020202020204" pitchFamily="34" charset="0"/>
+              <a:buChar char="•"/>
             </a:pPr>
             <a:r>
               <a:rPr lang="it-IT" dirty="0"/>
-              <a:t>Costruiamo i campi allocando uno spazio in memoria per ogni variabile per i tipi non classe</a:t>
-            </a:r>
-          </a:p>
-          <a:p>
-            <a:pPr marL="342900" indent="-342900">
-              <a:buFont typeface="+mj-lt"/>
-              <a:buAutoNum type="arabicPeriod"/>
-            </a:pPr>
+              <a:t>Come per i costruttori, di default è disponibile il distruttore standard (esempio qui sotto)</a:t>
+            </a:r>
+          </a:p>
+          <a:p>
             <a:endParaRPr lang="it-IT" dirty="0"/>
-          </a:p>
-          <a:p>
-            <a:pPr marL="342900" indent="-342900">
-              <a:buFont typeface="+mj-lt"/>
-              <a:buAutoNum type="arabicPeriod"/>
-            </a:pPr>
-            <a:r>
-              <a:rPr lang="it-IT" dirty="0"/>
-              <a:t>Per ogni campo di tipo classe, chiamiamo costruttore default</a:t>
-            </a:r>
-          </a:p>
-          <a:p>
-            <a:pPr marL="342900" indent="-342900">
-              <a:buFont typeface="+mj-lt"/>
-              <a:buAutoNum type="arabicPeriod"/>
-            </a:pPr>
-            <a:endParaRPr lang="it-IT" dirty="0"/>
-          </a:p>
-          <a:p>
-            <a:pPr marL="342900" indent="-342900">
-              <a:buFont typeface="+mj-lt"/>
-              <a:buAutoNum type="arabicPeriod"/>
-            </a:pPr>
-            <a:r>
-              <a:rPr lang="it-IT" dirty="0"/>
-              <a:t>Eseguiamo il corpo del costruttore</a:t>
-            </a:r>
           </a:p>
         </p:txBody>
       </p:sp>
       <p:pic>
         <p:nvPicPr>
-          <p:cNvPr id="6" name="Immagine 5">
-            <a:extLst>
-              <a:ext uri="{FF2B5EF4-FFF2-40B4-BE49-F238E27FC236}">
-                <a16:creationId xmlns:a16="http://schemas.microsoft.com/office/drawing/2014/main" id="{23A7DF75-AE9D-ACF9-FA18-F2856AD1E584}"/>
+          <p:cNvPr id="7" name="Immagine 6">
+            <a:extLst>
+              <a:ext uri="{FF2B5EF4-FFF2-40B4-BE49-F238E27FC236}">
+                <a16:creationId xmlns:a16="http://schemas.microsoft.com/office/drawing/2014/main" id="{FF1A6ED0-86E5-DAED-6B91-8D563CB38114}"/>
               </a:ext>
             </a:extLst>
           </p:cNvPr>
@@ -3926,18 +3926,60 @@
         </p:blipFill>
         <p:spPr>
           <a:xfrm>
-            <a:off x="1666878" y="4263669"/>
-            <a:ext cx="5810244" cy="825719"/>
+            <a:off x="3502095" y="2788285"/>
+            <a:ext cx="1749132" cy="911224"/>
           </a:xfrm>
           <a:prstGeom prst="rect">
             <a:avLst/>
           </a:prstGeom>
         </p:spPr>
       </p:pic>
+      <p:sp>
+        <p:nvSpPr>
+          <p:cNvPr id="8" name="CasellaDiTesto 7">
+            <a:extLst>
+              <a:ext uri="{FF2B5EF4-FFF2-40B4-BE49-F238E27FC236}">
+                <a16:creationId xmlns:a16="http://schemas.microsoft.com/office/drawing/2014/main" id="{949235FA-4067-61FC-29AA-97E6509653B2}"/>
+              </a:ext>
+            </a:extLst>
+          </p:cNvPr>
+          <p:cNvSpPr txBox="1"/>
+          <p:nvPr/>
+        </p:nvSpPr>
+        <p:spPr>
+          <a:xfrm>
+            <a:off x="1172963" y="3940176"/>
+            <a:ext cx="6662374" cy="1200329"/>
+          </a:xfrm>
+          <a:prstGeom prst="rect">
+            <a:avLst/>
+          </a:prstGeom>
+          <a:noFill/>
+        </p:spPr>
+        <p:txBody>
+          <a:bodyPr wrap="square" rtlCol="0">
+            <a:spAutoFit/>
+          </a:bodyPr>
+          <a:lstStyle/>
+          <a:p>
+            <a:pPr marL="285750" indent="-285750">
+              <a:buFont typeface="Arial" panose="020B0604020202020204" pitchFamily="34" charset="0"/>
+              <a:buChar char="•"/>
+            </a:pPr>
+            <a:r>
+              <a:rPr lang="it-IT" dirty="0"/>
+              <a:t>Vogliamo eseguire una distruzione profonda (aka, tutta la memoria allocata dall’oggetto, compresi puntatori e riferimenti, quindi anche tutte le variabili dentro)</a:t>
+            </a:r>
+          </a:p>
+          <a:p>
+            <a:endParaRPr lang="it-IT" dirty="0"/>
+          </a:p>
+        </p:txBody>
+      </p:sp>
     </p:spTree>
     <p:extLst>
       <p:ext uri="{BB962C8B-B14F-4D97-AF65-F5344CB8AC3E}">
-        <p14:creationId xmlns:p14="http://schemas.microsoft.com/office/powerpoint/2010/main" val="2865899089"/>
+        <p14:creationId xmlns:p14="http://schemas.microsoft.com/office/powerpoint/2010/main" val="3296739001"/>
       </p:ext>
     </p:extLst>
   </p:cSld>
@@ -4158,7 +4200,7 @@
           <a:p>
             <a:r>
               <a:rPr lang="it-IT" dirty="0"/>
-              <a:t>Distruttori</a:t>
+              <a:t>Distruttori: regole</a:t>
             </a:r>
           </a:p>
         </p:txBody>
@@ -4211,7 +4253,7 @@
         <p:spPr>
           <a:xfrm>
             <a:off x="1020563" y="1440497"/>
-            <a:ext cx="6662374" cy="1477328"/>
+            <a:ext cx="6662374" cy="4801314"/>
           </a:xfrm>
           <a:prstGeom prst="rect">
             <a:avLst/>
@@ -4229,8 +4271,12 @@
               <a:buChar char="•"/>
             </a:pPr>
             <a:r>
-              <a:rPr lang="it-IT" dirty="0"/>
-              <a:t>Evitano gli sprechi di memoria e rilasciano la memoria occupata</a:t>
+              <a:rPr lang="it-IT" b="1" dirty="0"/>
+              <a:t>Oggetti statici</a:t>
+            </a:r>
+            <a:r>
+              <a:rPr lang="it-IT" dirty="0"/>
+              <a:t>: al termine del main (per ultimi)</a:t>
             </a:r>
           </a:p>
           <a:p>
@@ -4246,80 +4292,124 @@
               <a:buChar char="•"/>
             </a:pPr>
             <a:r>
-              <a:rPr lang="it-IT" dirty="0"/>
-              <a:t>Come per i costruttori, di default è disponibile il distruttore standard (esempio qui sotto)</a:t>
-            </a:r>
-          </a:p>
-          <a:p>
-            <a:endParaRPr lang="it-IT" dirty="0"/>
-          </a:p>
-        </p:txBody>
-      </p:sp>
-      <p:pic>
-        <p:nvPicPr>
-          <p:cNvPr id="7" name="Immagine 6">
-            <a:extLst>
-              <a:ext uri="{FF2B5EF4-FFF2-40B4-BE49-F238E27FC236}">
-                <a16:creationId xmlns:a16="http://schemas.microsoft.com/office/drawing/2014/main" id="{FF1A6ED0-86E5-DAED-6B91-8D563CB38114}"/>
-              </a:ext>
-            </a:extLst>
-          </p:cNvPr>
-          <p:cNvPicPr>
-            <a:picLocks noChangeAspect="1"/>
-          </p:cNvPicPr>
-          <p:nvPr/>
-        </p:nvPicPr>
-        <p:blipFill>
-          <a:blip r:embed="rId2"/>
-          <a:stretch>
-            <a:fillRect/>
-          </a:stretch>
-        </p:blipFill>
-        <p:spPr>
-          <a:xfrm>
-            <a:off x="3502095" y="2788285"/>
-            <a:ext cx="1749132" cy="911224"/>
-          </a:xfrm>
-          <a:prstGeom prst="rect">
-            <a:avLst/>
-          </a:prstGeom>
-        </p:spPr>
-      </p:pic>
-      <p:sp>
-        <p:nvSpPr>
-          <p:cNvPr id="8" name="CasellaDiTesto 7">
-            <a:extLst>
-              <a:ext uri="{FF2B5EF4-FFF2-40B4-BE49-F238E27FC236}">
-                <a16:creationId xmlns:a16="http://schemas.microsoft.com/office/drawing/2014/main" id="{949235FA-4067-61FC-29AA-97E6509653B2}"/>
-              </a:ext>
-            </a:extLst>
-          </p:cNvPr>
-          <p:cNvSpPr txBox="1"/>
-          <p:nvPr/>
-        </p:nvSpPr>
-        <p:spPr>
-          <a:xfrm>
-            <a:off x="1172963" y="3940176"/>
-            <a:ext cx="6662374" cy="1200329"/>
-          </a:xfrm>
-          <a:prstGeom prst="rect">
-            <a:avLst/>
-          </a:prstGeom>
-          <a:noFill/>
-        </p:spPr>
-        <p:txBody>
-          <a:bodyPr wrap="square" rtlCol="0">
-            <a:spAutoFit/>
-          </a:bodyPr>
-          <a:lstStyle/>
+              <a:rPr lang="it-IT" b="1" dirty="0"/>
+              <a:t>Oggetti di classe automatica</a:t>
+            </a:r>
+            <a:r>
+              <a:rPr lang="it-IT" dirty="0"/>
+              <a:t>: alla fine del blocco di definizione</a:t>
+            </a:r>
+          </a:p>
           <a:p>
             <a:pPr marL="285750" indent="-285750">
               <a:buFont typeface="Arial" panose="020B0604020202020204" pitchFamily="34" charset="0"/>
               <a:buChar char="•"/>
             </a:pPr>
-            <a:r>
-              <a:rPr lang="it-IT" dirty="0"/>
-              <a:t>Vogliamo eseguire una distruzione profonda (aka, tutta la memoria allocata dall’oggetto, compresi puntatori e riferimenti, quindi anche tutte le variabili dentro)</a:t>
+            <a:endParaRPr lang="it-IT" dirty="0"/>
+          </a:p>
+          <a:p>
+            <a:pPr marL="285750" indent="-285750">
+              <a:buFont typeface="Arial" panose="020B0604020202020204" pitchFamily="34" charset="0"/>
+              <a:buChar char="•"/>
+            </a:pPr>
+            <a:r>
+              <a:rPr lang="it-IT" b="1" dirty="0"/>
+              <a:t>Oggetti dinamici</a:t>
+            </a:r>
+            <a:r>
+              <a:rPr lang="it-IT" dirty="0"/>
+              <a:t>: chiamando </a:t>
+            </a:r>
+            <a:r>
+              <a:rPr lang="it-IT" dirty="0">
+                <a:latin typeface="Courier New" panose="02070309020205020404" pitchFamily="49" charset="0"/>
+                <a:cs typeface="Courier New" panose="02070309020205020404" pitchFamily="49" charset="0"/>
+              </a:rPr>
+              <a:t>delete</a:t>
+            </a:r>
+          </a:p>
+          <a:p>
+            <a:pPr marL="285750" indent="-285750">
+              <a:buFont typeface="Arial" panose="020B0604020202020204" pitchFamily="34" charset="0"/>
+              <a:buChar char="•"/>
+            </a:pPr>
+            <a:endParaRPr lang="it-IT" dirty="0"/>
+          </a:p>
+          <a:p>
+            <a:r>
+              <a:rPr lang="it-IT" u="sng" dirty="0"/>
+              <a:t>Seguono l’ordine inverso rispetto alla costruzione dei dati</a:t>
+            </a:r>
+            <a:r>
+              <a:rPr lang="it-IT" dirty="0"/>
+              <a:t>.</a:t>
+            </a:r>
+          </a:p>
+          <a:p>
+            <a:endParaRPr lang="it-IT" u="sng" dirty="0"/>
+          </a:p>
+          <a:p>
+            <a:r>
+              <a:rPr lang="it-IT" dirty="0"/>
+              <a:t>Ordine:</a:t>
+            </a:r>
+          </a:p>
+          <a:p>
+            <a:endParaRPr lang="it-IT" dirty="0"/>
+          </a:p>
+          <a:p>
+            <a:pPr marL="342900" indent="-342900">
+              <a:buFont typeface="+mj-lt"/>
+              <a:buAutoNum type="arabicPeriod"/>
+            </a:pPr>
+            <a:r>
+              <a:rPr lang="it-IT" dirty="0"/>
+              <a:t>variabili locali all’uscita di una funzione</a:t>
+            </a:r>
+          </a:p>
+          <a:p>
+            <a:pPr marL="342900" indent="-342900">
+              <a:buFont typeface="+mj-lt"/>
+              <a:buAutoNum type="arabicPeriod"/>
+            </a:pPr>
+            <a:endParaRPr lang="it-IT" dirty="0"/>
+          </a:p>
+          <a:p>
+            <a:pPr marL="342900" indent="-342900">
+              <a:buFont typeface="+mj-lt"/>
+              <a:buAutoNum type="arabicPeriod"/>
+            </a:pPr>
+            <a:r>
+              <a:rPr lang="it-IT" dirty="0"/>
+              <a:t>oggetto anonimo ritornato per valore (aka, valore passato a una funzione o </a:t>
+            </a:r>
+            <a:r>
+              <a:rPr lang="it-IT" dirty="0">
+                <a:latin typeface="Courier New" panose="02070309020205020404" pitchFamily="49" charset="0"/>
+                <a:cs typeface="Courier New" panose="02070309020205020404" pitchFamily="49" charset="0"/>
+              </a:rPr>
+              <a:t>return</a:t>
+            </a:r>
+            <a:r>
+              <a:rPr lang="it-IT" dirty="0"/>
+              <a:t>)</a:t>
+            </a:r>
+          </a:p>
+          <a:p>
+            <a:pPr marL="342900" indent="-342900">
+              <a:buFont typeface="+mj-lt"/>
+              <a:buAutoNum type="arabicPeriod"/>
+            </a:pPr>
+            <a:endParaRPr lang="it-IT" dirty="0"/>
+          </a:p>
+          <a:p>
+            <a:pPr marL="342900" indent="-342900">
+              <a:buFont typeface="+mj-lt"/>
+              <a:buAutoNum type="arabicPeriod"/>
+            </a:pPr>
+            <a:r>
+              <a:rPr lang="it-IT" dirty="0"/>
+              <a:t>parametri passati per valore</a:t>
             </a:r>
           </a:p>
           <a:p>
@@ -4330,7 +4420,7 @@
     </p:spTree>
     <p:extLst>
       <p:ext uri="{BB962C8B-B14F-4D97-AF65-F5344CB8AC3E}">
-        <p14:creationId xmlns:p14="http://schemas.microsoft.com/office/powerpoint/2010/main" val="3296739001"/>
+        <p14:creationId xmlns:p14="http://schemas.microsoft.com/office/powerpoint/2010/main" val="2614376314"/>
       </p:ext>
     </p:extLst>
   </p:cSld>
@@ -4410,276 +4500,6 @@
               <a:rPr lang="en-US" smtClean="0"/>
               <a:pPr/>
               <a:t>21</a:t>
-            </a:fld>
-            <a:r>
-              <a:rPr lang="en-US" dirty="0"/>
-              <a:t> di 35</a:t>
-            </a:r>
-          </a:p>
-        </p:txBody>
-      </p:sp>
-      <p:sp>
-        <p:nvSpPr>
-          <p:cNvPr id="3" name="CasellaDiTesto 2">
-            <a:extLst>
-              <a:ext uri="{FF2B5EF4-FFF2-40B4-BE49-F238E27FC236}">
-                <a16:creationId xmlns:a16="http://schemas.microsoft.com/office/drawing/2014/main" id="{882FCE22-207E-4077-C468-65DB9728DF24}"/>
-              </a:ext>
-            </a:extLst>
-          </p:cNvPr>
-          <p:cNvSpPr txBox="1"/>
-          <p:nvPr/>
-        </p:nvSpPr>
-        <p:spPr>
-          <a:xfrm>
-            <a:off x="1020563" y="1440497"/>
-            <a:ext cx="6662374" cy="4801314"/>
-          </a:xfrm>
-          <a:prstGeom prst="rect">
-            <a:avLst/>
-          </a:prstGeom>
-          <a:noFill/>
-        </p:spPr>
-        <p:txBody>
-          <a:bodyPr wrap="square" rtlCol="0">
-            <a:spAutoFit/>
-          </a:bodyPr>
-          <a:lstStyle/>
-          <a:p>
-            <a:pPr marL="285750" indent="-285750">
-              <a:buFont typeface="Arial" panose="020B0604020202020204" pitchFamily="34" charset="0"/>
-              <a:buChar char="•"/>
-            </a:pPr>
-            <a:r>
-              <a:rPr lang="it-IT" b="1" dirty="0"/>
-              <a:t>Oggetti statici</a:t>
-            </a:r>
-            <a:r>
-              <a:rPr lang="it-IT" dirty="0"/>
-              <a:t>: al termine del main (per ultimi)</a:t>
-            </a:r>
-          </a:p>
-          <a:p>
-            <a:pPr marL="285750" indent="-285750">
-              <a:buFont typeface="Arial" panose="020B0604020202020204" pitchFamily="34" charset="0"/>
-              <a:buChar char="•"/>
-            </a:pPr>
-            <a:endParaRPr lang="it-IT" dirty="0"/>
-          </a:p>
-          <a:p>
-            <a:pPr marL="285750" indent="-285750">
-              <a:buFont typeface="Arial" panose="020B0604020202020204" pitchFamily="34" charset="0"/>
-              <a:buChar char="•"/>
-            </a:pPr>
-            <a:r>
-              <a:rPr lang="it-IT" b="1" dirty="0"/>
-              <a:t>Oggetti di classe automatica</a:t>
-            </a:r>
-            <a:r>
-              <a:rPr lang="it-IT" dirty="0"/>
-              <a:t>: alla fine del blocco di definizione</a:t>
-            </a:r>
-          </a:p>
-          <a:p>
-            <a:pPr marL="285750" indent="-285750">
-              <a:buFont typeface="Arial" panose="020B0604020202020204" pitchFamily="34" charset="0"/>
-              <a:buChar char="•"/>
-            </a:pPr>
-            <a:endParaRPr lang="it-IT" dirty="0"/>
-          </a:p>
-          <a:p>
-            <a:pPr marL="285750" indent="-285750">
-              <a:buFont typeface="Arial" panose="020B0604020202020204" pitchFamily="34" charset="0"/>
-              <a:buChar char="•"/>
-            </a:pPr>
-            <a:r>
-              <a:rPr lang="it-IT" b="1" dirty="0"/>
-              <a:t>Oggetti dinamici</a:t>
-            </a:r>
-            <a:r>
-              <a:rPr lang="it-IT" dirty="0"/>
-              <a:t>: chiamando </a:t>
-            </a:r>
-            <a:r>
-              <a:rPr lang="it-IT" dirty="0">
-                <a:latin typeface="Courier New" panose="02070309020205020404" pitchFamily="49" charset="0"/>
-                <a:cs typeface="Courier New" panose="02070309020205020404" pitchFamily="49" charset="0"/>
-              </a:rPr>
-              <a:t>delete</a:t>
-            </a:r>
-          </a:p>
-          <a:p>
-            <a:pPr marL="285750" indent="-285750">
-              <a:buFont typeface="Arial" panose="020B0604020202020204" pitchFamily="34" charset="0"/>
-              <a:buChar char="•"/>
-            </a:pPr>
-            <a:endParaRPr lang="it-IT" dirty="0"/>
-          </a:p>
-          <a:p>
-            <a:r>
-              <a:rPr lang="it-IT" u="sng" dirty="0"/>
-              <a:t>Seguono l’ordine inverso rispetto alla costruzione dei dati</a:t>
-            </a:r>
-            <a:r>
-              <a:rPr lang="it-IT" dirty="0"/>
-              <a:t>.</a:t>
-            </a:r>
-          </a:p>
-          <a:p>
-            <a:endParaRPr lang="it-IT" u="sng" dirty="0"/>
-          </a:p>
-          <a:p>
-            <a:r>
-              <a:rPr lang="it-IT" dirty="0"/>
-              <a:t>Ordine:</a:t>
-            </a:r>
-          </a:p>
-          <a:p>
-            <a:endParaRPr lang="it-IT" dirty="0"/>
-          </a:p>
-          <a:p>
-            <a:pPr marL="342900" indent="-342900">
-              <a:buFont typeface="+mj-lt"/>
-              <a:buAutoNum type="arabicPeriod"/>
-            </a:pPr>
-            <a:r>
-              <a:rPr lang="it-IT" dirty="0"/>
-              <a:t>variabili locali all’uscita di una funzione</a:t>
-            </a:r>
-          </a:p>
-          <a:p>
-            <a:pPr marL="342900" indent="-342900">
-              <a:buFont typeface="+mj-lt"/>
-              <a:buAutoNum type="arabicPeriod"/>
-            </a:pPr>
-            <a:endParaRPr lang="it-IT" dirty="0"/>
-          </a:p>
-          <a:p>
-            <a:pPr marL="342900" indent="-342900">
-              <a:buFont typeface="+mj-lt"/>
-              <a:buAutoNum type="arabicPeriod"/>
-            </a:pPr>
-            <a:r>
-              <a:rPr lang="it-IT" dirty="0"/>
-              <a:t>oggetto anonimo ritornato per valore (aka, valore passato a una funzione o </a:t>
-            </a:r>
-            <a:r>
-              <a:rPr lang="it-IT" dirty="0">
-                <a:latin typeface="Courier New" panose="02070309020205020404" pitchFamily="49" charset="0"/>
-                <a:cs typeface="Courier New" panose="02070309020205020404" pitchFamily="49" charset="0"/>
-              </a:rPr>
-              <a:t>return</a:t>
-            </a:r>
-            <a:r>
-              <a:rPr lang="it-IT" dirty="0"/>
-              <a:t>)</a:t>
-            </a:r>
-          </a:p>
-          <a:p>
-            <a:pPr marL="342900" indent="-342900">
-              <a:buFont typeface="+mj-lt"/>
-              <a:buAutoNum type="arabicPeriod"/>
-            </a:pPr>
-            <a:endParaRPr lang="it-IT" dirty="0"/>
-          </a:p>
-          <a:p>
-            <a:pPr marL="342900" indent="-342900">
-              <a:buFont typeface="+mj-lt"/>
-              <a:buAutoNum type="arabicPeriod"/>
-            </a:pPr>
-            <a:r>
-              <a:rPr lang="it-IT" dirty="0"/>
-              <a:t>parametri passati per valore</a:t>
-            </a:r>
-          </a:p>
-          <a:p>
-            <a:endParaRPr lang="it-IT" dirty="0"/>
-          </a:p>
-        </p:txBody>
-      </p:sp>
-    </p:spTree>
-    <p:extLst>
-      <p:ext uri="{BB962C8B-B14F-4D97-AF65-F5344CB8AC3E}">
-        <p14:creationId xmlns:p14="http://schemas.microsoft.com/office/powerpoint/2010/main" val="2614376314"/>
-      </p:ext>
-    </p:extLst>
-  </p:cSld>
-  <p:clrMapOvr>
-    <a:masterClrMapping/>
-  </p:clrMapOvr>
-</p:sld>
-</file>
-
-<file path=ppt/slides/slide22.xml><?xml version="1.0" encoding="utf-8"?>
-<p:sld xmlns:a="http://schemas.openxmlformats.org/drawingml/2006/main" xmlns:r="http://schemas.openxmlformats.org/officeDocument/2006/relationships" xmlns:p="http://schemas.openxmlformats.org/presentationml/2006/main">
-  <p:cSld>
-    <p:spTree>
-      <p:nvGrpSpPr>
-        <p:cNvPr id="1" name=""/>
-        <p:cNvGrpSpPr/>
-        <p:nvPr/>
-      </p:nvGrpSpPr>
-      <p:grpSpPr>
-        <a:xfrm>
-          <a:off x="0" y="0"/>
-          <a:ext cx="0" cy="0"/>
-          <a:chOff x="0" y="0"/>
-          <a:chExt cx="0" cy="0"/>
-        </a:xfrm>
-      </p:grpSpPr>
-      <p:sp>
-        <p:nvSpPr>
-          <p:cNvPr id="2" name="Titolo 1">
-            <a:extLst>
-              <a:ext uri="{FF2B5EF4-FFF2-40B4-BE49-F238E27FC236}">
-                <a16:creationId xmlns:a16="http://schemas.microsoft.com/office/drawing/2014/main" id="{A1C33B46-A1F8-111B-8108-D696C1BBCC68}"/>
-              </a:ext>
-            </a:extLst>
-          </p:cNvPr>
-          <p:cNvSpPr>
-            <a:spLocks noGrp="1"/>
-          </p:cNvSpPr>
-          <p:nvPr>
-            <p:ph type="title"/>
-          </p:nvPr>
-        </p:nvSpPr>
-        <p:spPr/>
-        <p:txBody>
-          <a:bodyPr/>
-          <a:lstStyle/>
-          <a:p>
-            <a:r>
-              <a:rPr lang="it-IT" dirty="0"/>
-              <a:t>Distruttori: regole</a:t>
-            </a:r>
-          </a:p>
-        </p:txBody>
-      </p:sp>
-      <p:sp>
-        <p:nvSpPr>
-          <p:cNvPr id="4" name="Segnaposto numero diapositiva 3">
-            <a:extLst>
-              <a:ext uri="{FF2B5EF4-FFF2-40B4-BE49-F238E27FC236}">
-                <a16:creationId xmlns:a16="http://schemas.microsoft.com/office/drawing/2014/main" id="{30F37182-85E1-1CBA-A05A-CCEC4E40C29C}"/>
-              </a:ext>
-            </a:extLst>
-          </p:cNvPr>
-          <p:cNvSpPr>
-            <a:spLocks noGrp="1"/>
-          </p:cNvSpPr>
-          <p:nvPr>
-            <p:ph type="sldNum" sz="quarter" idx="4"/>
-          </p:nvPr>
-        </p:nvSpPr>
-        <p:spPr/>
-        <p:txBody>
-          <a:bodyPr/>
-          <a:lstStyle/>
-          <a:p>
-            <a:fld id="{4D021CEB-2F22-4EA1-9BAF-E3833982B82A}" type="slidenum">
-              <a:rPr lang="en-US" smtClean="0"/>
-              <a:pPr/>
-              <a:t>22</a:t>
             </a:fld>
             <a:r>
               <a:rPr lang="en-US" dirty="0"/>
@@ -4880,7 +4700,7 @@
 </p:sld>
 </file>
 
-<file path=ppt/slides/slide23.xml><?xml version="1.0" encoding="utf-8"?>
+<file path=ppt/slides/slide22.xml><?xml version="1.0" encoding="utf-8"?>
 <p:sld xmlns:a="http://schemas.openxmlformats.org/drawingml/2006/main" xmlns:r="http://schemas.openxmlformats.org/officeDocument/2006/relationships" xmlns:p="http://schemas.openxmlformats.org/presentationml/2006/main">
   <p:cSld>
     <p:spTree>
@@ -4949,7 +4769,7 @@
             <a:fld id="{4D021CEB-2F22-4EA1-9BAF-E3833982B82A}" type="slidenum">
               <a:rPr lang="en-US" smtClean="0"/>
               <a:pPr/>
-              <a:t>23</a:t>
+              <a:t>22</a:t>
             </a:fld>
             <a:r>
               <a:rPr lang="en-US" dirty="0"/>
@@ -5031,7 +4851,7 @@
 </p:sld>
 </file>
 
-<file path=ppt/slides/slide24.xml><?xml version="1.0" encoding="utf-8"?>
+<file path=ppt/slides/slide23.xml><?xml version="1.0" encoding="utf-8"?>
 <p:sld xmlns:a="http://schemas.openxmlformats.org/drawingml/2006/main" xmlns:r="http://schemas.openxmlformats.org/officeDocument/2006/relationships" xmlns:p="http://schemas.openxmlformats.org/presentationml/2006/main">
   <p:cSld>
     <p:spTree>
@@ -5100,7 +4920,7 @@
             <a:fld id="{4D021CEB-2F22-4EA1-9BAF-E3833982B82A}" type="slidenum">
               <a:rPr lang="en-US" smtClean="0"/>
               <a:pPr/>
-              <a:t>24</a:t>
+              <a:t>23</a:t>
             </a:fld>
             <a:r>
               <a:rPr lang="en-US" dirty="0"/>
@@ -5152,7 +4972,7 @@
 </p:sld>
 </file>
 
-<file path=ppt/slides/slide25.xml><?xml version="1.0" encoding="utf-8"?>
+<file path=ppt/slides/slide24.xml><?xml version="1.0" encoding="utf-8"?>
 <p:sld xmlns:a="http://schemas.openxmlformats.org/drawingml/2006/main" xmlns:r="http://schemas.openxmlformats.org/officeDocument/2006/relationships" xmlns:p="http://schemas.openxmlformats.org/presentationml/2006/main">
   <p:cSld>
     <p:spTree>
@@ -5221,7 +5041,7 @@
             <a:fld id="{4D021CEB-2F22-4EA1-9BAF-E3833982B82A}" type="slidenum">
               <a:rPr lang="en-US" smtClean="0"/>
               <a:pPr/>
-              <a:t>25</a:t>
+              <a:t>24</a:t>
             </a:fld>
             <a:r>
               <a:rPr lang="en-US" dirty="0"/>
@@ -5303,7 +5123,7 @@
 </p:sld>
 </file>
 
-<file path=ppt/slides/slide26.xml><?xml version="1.0" encoding="utf-8"?>
+<file path=ppt/slides/slide25.xml><?xml version="1.0" encoding="utf-8"?>
 <p:sld xmlns:a="http://schemas.openxmlformats.org/drawingml/2006/main" xmlns:r="http://schemas.openxmlformats.org/officeDocument/2006/relationships" xmlns:p="http://schemas.openxmlformats.org/presentationml/2006/main">
   <p:cSld>
     <p:spTree>
@@ -5372,7 +5192,7 @@
             <a:fld id="{4D021CEB-2F22-4EA1-9BAF-E3833982B82A}" type="slidenum">
               <a:rPr lang="en-US" smtClean="0"/>
               <a:pPr/>
-              <a:t>26</a:t>
+              <a:t>25</a:t>
             </a:fld>
             <a:r>
               <a:rPr lang="en-US" dirty="0"/>
@@ -5424,7 +5244,7 @@
 </p:sld>
 </file>
 
-<file path=ppt/slides/slide27.xml><?xml version="1.0" encoding="utf-8"?>
+<file path=ppt/slides/slide26.xml><?xml version="1.0" encoding="utf-8"?>
 <p:sld xmlns:a="http://schemas.openxmlformats.org/drawingml/2006/main" xmlns:r="http://schemas.openxmlformats.org/officeDocument/2006/relationships" xmlns:p="http://schemas.openxmlformats.org/presentationml/2006/main">
   <p:cSld>
     <p:spTree>
@@ -5493,7 +5313,7 @@
             <a:fld id="{4D021CEB-2F22-4EA1-9BAF-E3833982B82A}" type="slidenum">
               <a:rPr lang="en-US" smtClean="0"/>
               <a:pPr/>
-              <a:t>27</a:t>
+              <a:t>26</a:t>
             </a:fld>
             <a:r>
               <a:rPr lang="en-US" dirty="0"/>
@@ -5575,7 +5395,7 @@
 </p:sld>
 </file>
 
-<file path=ppt/slides/slide28.xml><?xml version="1.0" encoding="utf-8"?>
+<file path=ppt/slides/slide27.xml><?xml version="1.0" encoding="utf-8"?>
 <p:sld xmlns:a="http://schemas.openxmlformats.org/drawingml/2006/main" xmlns:r="http://schemas.openxmlformats.org/officeDocument/2006/relationships" xmlns:p="http://schemas.openxmlformats.org/presentationml/2006/main">
   <p:cSld>
     <p:spTree>
@@ -5644,7 +5464,7 @@
             <a:fld id="{4D021CEB-2F22-4EA1-9BAF-E3833982B82A}" type="slidenum">
               <a:rPr lang="en-US" smtClean="0"/>
               <a:pPr/>
-              <a:t>28</a:t>
+              <a:t>27</a:t>
             </a:fld>
             <a:r>
               <a:rPr lang="en-US" dirty="0"/>
@@ -5696,7 +5516,7 @@
 </p:sld>
 </file>
 
-<file path=ppt/slides/slide29.xml><?xml version="1.0" encoding="utf-8"?>
+<file path=ppt/slides/slide28.xml><?xml version="1.0" encoding="utf-8"?>
 <p:sld xmlns:a="http://schemas.openxmlformats.org/drawingml/2006/main" xmlns:r="http://schemas.openxmlformats.org/officeDocument/2006/relationships" xmlns:p="http://schemas.openxmlformats.org/presentationml/2006/main">
   <p:cSld>
     <p:spTree>
@@ -5767,7 +5587,7 @@
             <a:fld id="{4D021CEB-2F22-4EA1-9BAF-E3833982B82A}" type="slidenum">
               <a:rPr lang="en-US" smtClean="0"/>
               <a:pPr/>
-              <a:t>29</a:t>
+              <a:t>28</a:t>
             </a:fld>
             <a:r>
               <a:rPr lang="en-US" dirty="0"/>
@@ -5854,6 +5674,164 @@
     <p:extLst>
       <p:ext uri="{BB962C8B-B14F-4D97-AF65-F5344CB8AC3E}">
         <p14:creationId xmlns:p14="http://schemas.microsoft.com/office/powerpoint/2010/main" val="790277981"/>
+      </p:ext>
+    </p:extLst>
+  </p:cSld>
+  <p:clrMapOvr>
+    <a:masterClrMapping/>
+  </p:clrMapOvr>
+</p:sld>
+</file>
+
+<file path=ppt/slides/slide29.xml><?xml version="1.0" encoding="utf-8"?>
+<p:sld xmlns:a="http://schemas.openxmlformats.org/drawingml/2006/main" xmlns:r="http://schemas.openxmlformats.org/officeDocument/2006/relationships" xmlns:p="http://schemas.openxmlformats.org/presentationml/2006/main">
+  <p:cSld>
+    <p:spTree>
+      <p:nvGrpSpPr>
+        <p:cNvPr id="1" name=""/>
+        <p:cNvGrpSpPr/>
+        <p:nvPr/>
+      </p:nvGrpSpPr>
+      <p:grpSpPr>
+        <a:xfrm>
+          <a:off x="0" y="0"/>
+          <a:ext cx="0" cy="0"/>
+          <a:chOff x="0" y="0"/>
+          <a:chExt cx="0" cy="0"/>
+        </a:xfrm>
+      </p:grpSpPr>
+      <p:sp>
+        <p:nvSpPr>
+          <p:cNvPr id="2" name="Titolo 1">
+            <a:extLst>
+              <a:ext uri="{FF2B5EF4-FFF2-40B4-BE49-F238E27FC236}">
+                <a16:creationId xmlns:a16="http://schemas.microsoft.com/office/drawing/2014/main" id="{A1C33B46-A1F8-111B-8108-D696C1BBCC68}"/>
+              </a:ext>
+            </a:extLst>
+          </p:cNvPr>
+          <p:cNvSpPr>
+            <a:spLocks noGrp="1"/>
+          </p:cNvSpPr>
+          <p:nvPr>
+            <p:ph type="title"/>
+          </p:nvPr>
+        </p:nvSpPr>
+        <p:spPr/>
+        <p:txBody>
+          <a:bodyPr>
+            <a:noAutofit/>
+          </a:bodyPr>
+          <a:lstStyle/>
+          <a:p>
+            <a:r>
+              <a:rPr lang="it-IT" sz="3600" dirty="0"/>
+              <a:t>Dichiarazione incompleta della classe</a:t>
+            </a:r>
+          </a:p>
+        </p:txBody>
+      </p:sp>
+      <p:sp>
+        <p:nvSpPr>
+          <p:cNvPr id="4" name="Segnaposto numero diapositiva 3">
+            <a:extLst>
+              <a:ext uri="{FF2B5EF4-FFF2-40B4-BE49-F238E27FC236}">
+                <a16:creationId xmlns:a16="http://schemas.microsoft.com/office/drawing/2014/main" id="{30F37182-85E1-1CBA-A05A-CCEC4E40C29C}"/>
+              </a:ext>
+            </a:extLst>
+          </p:cNvPr>
+          <p:cNvSpPr>
+            <a:spLocks noGrp="1"/>
+          </p:cNvSpPr>
+          <p:nvPr>
+            <p:ph type="sldNum" sz="quarter" idx="4"/>
+          </p:nvPr>
+        </p:nvSpPr>
+        <p:spPr/>
+        <p:txBody>
+          <a:bodyPr/>
+          <a:lstStyle/>
+          <a:p>
+            <a:fld id="{4D021CEB-2F22-4EA1-9BAF-E3833982B82A}" type="slidenum">
+              <a:rPr lang="en-US" smtClean="0"/>
+              <a:pPr/>
+              <a:t>29</a:t>
+            </a:fld>
+            <a:r>
+              <a:rPr lang="en-US" dirty="0"/>
+              <a:t> di 35</a:t>
+            </a:r>
+          </a:p>
+        </p:txBody>
+      </p:sp>
+      <p:sp>
+        <p:nvSpPr>
+          <p:cNvPr id="3" name="CasellaDiTesto 2">
+            <a:extLst>
+              <a:ext uri="{FF2B5EF4-FFF2-40B4-BE49-F238E27FC236}">
+                <a16:creationId xmlns:a16="http://schemas.microsoft.com/office/drawing/2014/main" id="{5AE5C1FD-6FDC-2143-543C-C4CFC7B4710A}"/>
+              </a:ext>
+            </a:extLst>
+          </p:cNvPr>
+          <p:cNvSpPr txBox="1"/>
+          <p:nvPr/>
+        </p:nvSpPr>
+        <p:spPr>
+          <a:xfrm>
+            <a:off x="790640" y="1380112"/>
+            <a:ext cx="7562720" cy="923330"/>
+          </a:xfrm>
+          <a:prstGeom prst="rect">
+            <a:avLst/>
+          </a:prstGeom>
+          <a:noFill/>
+        </p:spPr>
+        <p:txBody>
+          <a:bodyPr wrap="square" rtlCol="0">
+            <a:spAutoFit/>
+          </a:bodyPr>
+          <a:lstStyle/>
+          <a:p>
+            <a:r>
+              <a:rPr lang="it-IT" dirty="0"/>
+              <a:t>Serve a fornire un'informazione di base sul nome della classe e a consentire l'utilizzo di puntatori o riferimenti a oggetti di quella classe prima che la sua definizione completa sia disponibile.</a:t>
+            </a:r>
+          </a:p>
+        </p:txBody>
+      </p:sp>
+      <p:pic>
+        <p:nvPicPr>
+          <p:cNvPr id="6" name="Immagine 5">
+            <a:extLst>
+              <a:ext uri="{FF2B5EF4-FFF2-40B4-BE49-F238E27FC236}">
+                <a16:creationId xmlns:a16="http://schemas.microsoft.com/office/drawing/2014/main" id="{B900663C-020D-15A4-F5C0-DA9ED781A41D}"/>
+              </a:ext>
+            </a:extLst>
+          </p:cNvPr>
+          <p:cNvPicPr>
+            <a:picLocks noChangeAspect="1"/>
+          </p:cNvPicPr>
+          <p:nvPr/>
+        </p:nvPicPr>
+        <p:blipFill>
+          <a:blip r:embed="rId2"/>
+          <a:stretch>
+            <a:fillRect/>
+          </a:stretch>
+        </p:blipFill>
+        <p:spPr>
+          <a:xfrm>
+            <a:off x="1442130" y="2569129"/>
+            <a:ext cx="6259739" cy="2955016"/>
+          </a:xfrm>
+          <a:prstGeom prst="rect">
+            <a:avLst/>
+          </a:prstGeom>
+        </p:spPr>
+      </p:pic>
+    </p:spTree>
+    <p:extLst>
+      <p:ext uri="{BB962C8B-B14F-4D97-AF65-F5344CB8AC3E}">
+        <p14:creationId xmlns:p14="http://schemas.microsoft.com/office/powerpoint/2010/main" val="3936829590"/>
       </p:ext>
     </p:extLst>
   </p:cSld>
@@ -6026,7 +6004,7 @@
           <a:p>
             <a:r>
               <a:rPr lang="it-IT" sz="3600" dirty="0"/>
-              <a:t>Dichiarazione incompleta della classe</a:t>
+              <a:t>Friend</a:t>
             </a:r>
           </a:p>
         </p:txBody>
@@ -6056,164 +6034,6 @@
               <a:rPr lang="en-US" smtClean="0"/>
               <a:pPr/>
               <a:t>30</a:t>
-            </a:fld>
-            <a:r>
-              <a:rPr lang="en-US" dirty="0"/>
-              <a:t> di 35</a:t>
-            </a:r>
-          </a:p>
-        </p:txBody>
-      </p:sp>
-      <p:sp>
-        <p:nvSpPr>
-          <p:cNvPr id="3" name="CasellaDiTesto 2">
-            <a:extLst>
-              <a:ext uri="{FF2B5EF4-FFF2-40B4-BE49-F238E27FC236}">
-                <a16:creationId xmlns:a16="http://schemas.microsoft.com/office/drawing/2014/main" id="{5AE5C1FD-6FDC-2143-543C-C4CFC7B4710A}"/>
-              </a:ext>
-            </a:extLst>
-          </p:cNvPr>
-          <p:cNvSpPr txBox="1"/>
-          <p:nvPr/>
-        </p:nvSpPr>
-        <p:spPr>
-          <a:xfrm>
-            <a:off x="790640" y="1380112"/>
-            <a:ext cx="7562720" cy="923330"/>
-          </a:xfrm>
-          <a:prstGeom prst="rect">
-            <a:avLst/>
-          </a:prstGeom>
-          <a:noFill/>
-        </p:spPr>
-        <p:txBody>
-          <a:bodyPr wrap="square" rtlCol="0">
-            <a:spAutoFit/>
-          </a:bodyPr>
-          <a:lstStyle/>
-          <a:p>
-            <a:r>
-              <a:rPr lang="it-IT" dirty="0"/>
-              <a:t>Serve a fornire un'informazione di base sul nome della classe e a consentire l'utilizzo di puntatori o riferimenti a oggetti di quella classe prima che la sua definizione completa sia disponibile.</a:t>
-            </a:r>
-          </a:p>
-        </p:txBody>
-      </p:sp>
-      <p:pic>
-        <p:nvPicPr>
-          <p:cNvPr id="6" name="Immagine 5">
-            <a:extLst>
-              <a:ext uri="{FF2B5EF4-FFF2-40B4-BE49-F238E27FC236}">
-                <a16:creationId xmlns:a16="http://schemas.microsoft.com/office/drawing/2014/main" id="{B900663C-020D-15A4-F5C0-DA9ED781A41D}"/>
-              </a:ext>
-            </a:extLst>
-          </p:cNvPr>
-          <p:cNvPicPr>
-            <a:picLocks noChangeAspect="1"/>
-          </p:cNvPicPr>
-          <p:nvPr/>
-        </p:nvPicPr>
-        <p:blipFill>
-          <a:blip r:embed="rId2"/>
-          <a:stretch>
-            <a:fillRect/>
-          </a:stretch>
-        </p:blipFill>
-        <p:spPr>
-          <a:xfrm>
-            <a:off x="1442130" y="2569129"/>
-            <a:ext cx="6259739" cy="2955016"/>
-          </a:xfrm>
-          <a:prstGeom prst="rect">
-            <a:avLst/>
-          </a:prstGeom>
-        </p:spPr>
-      </p:pic>
-    </p:spTree>
-    <p:extLst>
-      <p:ext uri="{BB962C8B-B14F-4D97-AF65-F5344CB8AC3E}">
-        <p14:creationId xmlns:p14="http://schemas.microsoft.com/office/powerpoint/2010/main" val="3936829590"/>
-      </p:ext>
-    </p:extLst>
-  </p:cSld>
-  <p:clrMapOvr>
-    <a:masterClrMapping/>
-  </p:clrMapOvr>
-</p:sld>
-</file>
-
-<file path=ppt/slides/slide31.xml><?xml version="1.0" encoding="utf-8"?>
-<p:sld xmlns:a="http://schemas.openxmlformats.org/drawingml/2006/main" xmlns:r="http://schemas.openxmlformats.org/officeDocument/2006/relationships" xmlns:p="http://schemas.openxmlformats.org/presentationml/2006/main">
-  <p:cSld>
-    <p:spTree>
-      <p:nvGrpSpPr>
-        <p:cNvPr id="1" name=""/>
-        <p:cNvGrpSpPr/>
-        <p:nvPr/>
-      </p:nvGrpSpPr>
-      <p:grpSpPr>
-        <a:xfrm>
-          <a:off x="0" y="0"/>
-          <a:ext cx="0" cy="0"/>
-          <a:chOff x="0" y="0"/>
-          <a:chExt cx="0" cy="0"/>
-        </a:xfrm>
-      </p:grpSpPr>
-      <p:sp>
-        <p:nvSpPr>
-          <p:cNvPr id="2" name="Titolo 1">
-            <a:extLst>
-              <a:ext uri="{FF2B5EF4-FFF2-40B4-BE49-F238E27FC236}">
-                <a16:creationId xmlns:a16="http://schemas.microsoft.com/office/drawing/2014/main" id="{A1C33B46-A1F8-111B-8108-D696C1BBCC68}"/>
-              </a:ext>
-            </a:extLst>
-          </p:cNvPr>
-          <p:cNvSpPr>
-            <a:spLocks noGrp="1"/>
-          </p:cNvSpPr>
-          <p:nvPr>
-            <p:ph type="title"/>
-          </p:nvPr>
-        </p:nvSpPr>
-        <p:spPr/>
-        <p:txBody>
-          <a:bodyPr>
-            <a:noAutofit/>
-          </a:bodyPr>
-          <a:lstStyle/>
-          <a:p>
-            <a:r>
-              <a:rPr lang="it-IT" sz="3600" dirty="0"/>
-              <a:t>Friend</a:t>
-            </a:r>
-          </a:p>
-        </p:txBody>
-      </p:sp>
-      <p:sp>
-        <p:nvSpPr>
-          <p:cNvPr id="4" name="Segnaposto numero diapositiva 3">
-            <a:extLst>
-              <a:ext uri="{FF2B5EF4-FFF2-40B4-BE49-F238E27FC236}">
-                <a16:creationId xmlns:a16="http://schemas.microsoft.com/office/drawing/2014/main" id="{30F37182-85E1-1CBA-A05A-CCEC4E40C29C}"/>
-              </a:ext>
-            </a:extLst>
-          </p:cNvPr>
-          <p:cNvSpPr>
-            <a:spLocks noGrp="1"/>
-          </p:cNvSpPr>
-          <p:nvPr>
-            <p:ph type="sldNum" sz="quarter" idx="4"/>
-          </p:nvPr>
-        </p:nvSpPr>
-        <p:spPr/>
-        <p:txBody>
-          <a:bodyPr/>
-          <a:lstStyle/>
-          <a:p>
-            <a:fld id="{4D021CEB-2F22-4EA1-9BAF-E3833982B82A}" type="slidenum">
-              <a:rPr lang="en-US" smtClean="0"/>
-              <a:pPr/>
-              <a:t>31</a:t>
             </a:fld>
             <a:r>
               <a:rPr lang="en-US" dirty="0"/>
@@ -6320,7 +6140,7 @@
 </p:sld>
 </file>
 
-<file path=ppt/slides/slide32.xml><?xml version="1.0" encoding="utf-8"?>
+<file path=ppt/slides/slide31.xml><?xml version="1.0" encoding="utf-8"?>
 <p:sld xmlns:a="http://schemas.openxmlformats.org/drawingml/2006/main" xmlns:r="http://schemas.openxmlformats.org/officeDocument/2006/relationships" xmlns:p="http://schemas.openxmlformats.org/presentationml/2006/main">
   <p:cSld>
     <p:spTree>
@@ -6391,7 +6211,7 @@
             <a:fld id="{4D021CEB-2F22-4EA1-9BAF-E3833982B82A}" type="slidenum">
               <a:rPr lang="en-US" smtClean="0"/>
               <a:pPr/>
-              <a:t>32</a:t>
+              <a:t>31</a:t>
             </a:fld>
             <a:r>
               <a:rPr lang="en-US" dirty="0"/>
@@ -6443,7 +6263,7 @@
 </p:sld>
 </file>
 
-<file path=ppt/slides/slide33.xml><?xml version="1.0" encoding="utf-8"?>
+<file path=ppt/slides/slide32.xml><?xml version="1.0" encoding="utf-8"?>
 <p:sld xmlns:a="http://schemas.openxmlformats.org/drawingml/2006/main" xmlns:r="http://schemas.openxmlformats.org/officeDocument/2006/relationships" xmlns:p="http://schemas.openxmlformats.org/presentationml/2006/main">
   <p:cSld>
     <p:spTree>
@@ -6514,7 +6334,7 @@
             <a:fld id="{4D021CEB-2F22-4EA1-9BAF-E3833982B82A}" type="slidenum">
               <a:rPr lang="en-US" smtClean="0"/>
               <a:pPr/>
-              <a:t>33</a:t>
+              <a:t>32</a:t>
             </a:fld>
             <a:r>
               <a:rPr lang="en-US" dirty="0"/>
@@ -6596,7 +6416,7 @@
 </p:sld>
 </file>
 
-<file path=ppt/slides/slide34.xml><?xml version="1.0" encoding="utf-8"?>
+<file path=ppt/slides/slide33.xml><?xml version="1.0" encoding="utf-8"?>
 <p:sld xmlns:a="http://schemas.openxmlformats.org/drawingml/2006/main" xmlns:r="http://schemas.openxmlformats.org/officeDocument/2006/relationships" xmlns:p="http://schemas.openxmlformats.org/presentationml/2006/main">
   <p:cSld>
     <p:spTree>
@@ -6667,7 +6487,7 @@
             <a:fld id="{4D021CEB-2F22-4EA1-9BAF-E3833982B82A}" type="slidenum">
               <a:rPr lang="en-US" smtClean="0"/>
               <a:pPr/>
-              <a:t>34</a:t>
+              <a:t>33</a:t>
             </a:fld>
             <a:r>
               <a:rPr lang="en-US" dirty="0"/>

</xml_diff>